<commit_message>
2015/5/28 Add class diagram
</commit_message>
<xml_diff>
--- a/DM_PJ03_Probability.pptx
+++ b/DM_PJ03_Probability.pptx
@@ -5,15 +5,20 @@
     <p:sldMasterId id="2147483648" r:id="rId1"/>
   </p:sldMasterIdLst>
   <p:notesMasterIdLst>
-    <p:notesMasterId r:id="rId8"/>
+    <p:notesMasterId r:id="rId13"/>
   </p:notesMasterIdLst>
   <p:sldIdLst>
     <p:sldId id="256" r:id="rId2"/>
     <p:sldId id="257" r:id="rId3"/>
     <p:sldId id="259" r:id="rId4"/>
     <p:sldId id="261" r:id="rId5"/>
-    <p:sldId id="260" r:id="rId6"/>
-    <p:sldId id="258" r:id="rId7"/>
+    <p:sldId id="266" r:id="rId6"/>
+    <p:sldId id="260" r:id="rId7"/>
+    <p:sldId id="264" r:id="rId8"/>
+    <p:sldId id="265" r:id="rId9"/>
+    <p:sldId id="262" r:id="rId10"/>
+    <p:sldId id="263" r:id="rId11"/>
+    <p:sldId id="258" r:id="rId12"/>
   </p:sldIdLst>
   <p:sldSz cx="12192000" cy="6858000"/>
   <p:notesSz cx="6858000" cy="9144000"/>
@@ -121,7 +126,12 @@
             <p14:sldId id="257"/>
             <p14:sldId id="259"/>
             <p14:sldId id="261"/>
+            <p14:sldId id="266"/>
             <p14:sldId id="260"/>
+            <p14:sldId id="264"/>
+            <p14:sldId id="265"/>
+            <p14:sldId id="262"/>
+            <p14:sldId id="263"/>
             <p14:sldId id="258"/>
           </p14:sldIdLst>
         </p14:section>
@@ -216,7 +226,7 @@
           <a:p>
             <a:fld id="{3B5DFD4B-5A95-449E-A695-0FEB48B770F1}" type="datetimeFigureOut">
               <a:rPr lang="zh-TW" altLang="en-US" smtClean="0"/>
-              <a:t>2015/5/27</a:t>
+              <a:t>2015/5/28</a:t>
             </a:fld>
             <a:endParaRPr lang="zh-TW" altLang="en-US"/>
           </a:p>
@@ -569,7 +579,7 @@
           <a:p>
             <a:fld id="{D753F71A-A365-4183-895D-3BFA477ED774}" type="slidenum">
               <a:rPr lang="zh-TW" altLang="en-US" smtClean="0"/>
-              <a:t>6</a:t>
+              <a:t>11</a:t>
             </a:fld>
             <a:endParaRPr lang="zh-TW" altLang="en-US"/>
           </a:p>
@@ -719,7 +729,7 @@
           <a:p>
             <a:fld id="{7C83E2A3-B24E-4406-8D12-05C9EB45BDB5}" type="datetimeFigureOut">
               <a:rPr lang="zh-TW" altLang="en-US" smtClean="0"/>
-              <a:t>2015/5/27</a:t>
+              <a:t>2015/5/28</a:t>
             </a:fld>
             <a:endParaRPr lang="zh-TW" altLang="en-US"/>
           </a:p>
@@ -889,7 +899,7 @@
           <a:p>
             <a:fld id="{7C83E2A3-B24E-4406-8D12-05C9EB45BDB5}" type="datetimeFigureOut">
               <a:rPr lang="zh-TW" altLang="en-US" smtClean="0"/>
-              <a:t>2015/5/27</a:t>
+              <a:t>2015/5/28</a:t>
             </a:fld>
             <a:endParaRPr lang="zh-TW" altLang="en-US"/>
           </a:p>
@@ -1069,7 +1079,7 @@
           <a:p>
             <a:fld id="{7C83E2A3-B24E-4406-8D12-05C9EB45BDB5}" type="datetimeFigureOut">
               <a:rPr lang="zh-TW" altLang="en-US" smtClean="0"/>
-              <a:t>2015/5/27</a:t>
+              <a:t>2015/5/28</a:t>
             </a:fld>
             <a:endParaRPr lang="zh-TW" altLang="en-US"/>
           </a:p>
@@ -1239,7 +1249,7 @@
           <a:p>
             <a:fld id="{7C83E2A3-B24E-4406-8D12-05C9EB45BDB5}" type="datetimeFigureOut">
               <a:rPr lang="zh-TW" altLang="en-US" smtClean="0"/>
-              <a:t>2015/5/27</a:t>
+              <a:t>2015/5/28</a:t>
             </a:fld>
             <a:endParaRPr lang="zh-TW" altLang="en-US"/>
           </a:p>
@@ -1485,7 +1495,7 @@
           <a:p>
             <a:fld id="{7C83E2A3-B24E-4406-8D12-05C9EB45BDB5}" type="datetimeFigureOut">
               <a:rPr lang="zh-TW" altLang="en-US" smtClean="0"/>
-              <a:t>2015/5/27</a:t>
+              <a:t>2015/5/28</a:t>
             </a:fld>
             <a:endParaRPr lang="zh-TW" altLang="en-US"/>
           </a:p>
@@ -1717,7 +1727,7 @@
           <a:p>
             <a:fld id="{7C83E2A3-B24E-4406-8D12-05C9EB45BDB5}" type="datetimeFigureOut">
               <a:rPr lang="zh-TW" altLang="en-US" smtClean="0"/>
-              <a:t>2015/5/27</a:t>
+              <a:t>2015/5/28</a:t>
             </a:fld>
             <a:endParaRPr lang="zh-TW" altLang="en-US"/>
           </a:p>
@@ -2084,7 +2094,7 @@
           <a:p>
             <a:fld id="{7C83E2A3-B24E-4406-8D12-05C9EB45BDB5}" type="datetimeFigureOut">
               <a:rPr lang="zh-TW" altLang="en-US" smtClean="0"/>
-              <a:t>2015/5/27</a:t>
+              <a:t>2015/5/28</a:t>
             </a:fld>
             <a:endParaRPr lang="zh-TW" altLang="en-US"/>
           </a:p>
@@ -2202,7 +2212,7 @@
           <a:p>
             <a:fld id="{7C83E2A3-B24E-4406-8D12-05C9EB45BDB5}" type="datetimeFigureOut">
               <a:rPr lang="zh-TW" altLang="en-US" smtClean="0"/>
-              <a:t>2015/5/27</a:t>
+              <a:t>2015/5/28</a:t>
             </a:fld>
             <a:endParaRPr lang="zh-TW" altLang="en-US"/>
           </a:p>
@@ -2297,7 +2307,7 @@
           <a:p>
             <a:fld id="{7C83E2A3-B24E-4406-8D12-05C9EB45BDB5}" type="datetimeFigureOut">
               <a:rPr lang="zh-TW" altLang="en-US" smtClean="0"/>
-              <a:t>2015/5/27</a:t>
+              <a:t>2015/5/28</a:t>
             </a:fld>
             <a:endParaRPr lang="zh-TW" altLang="en-US"/>
           </a:p>
@@ -2574,7 +2584,7 @@
           <a:p>
             <a:fld id="{7C83E2A3-B24E-4406-8D12-05C9EB45BDB5}" type="datetimeFigureOut">
               <a:rPr lang="zh-TW" altLang="en-US" smtClean="0"/>
-              <a:t>2015/5/27</a:t>
+              <a:t>2015/5/28</a:t>
             </a:fld>
             <a:endParaRPr lang="zh-TW" altLang="en-US"/>
           </a:p>
@@ -2827,7 +2837,7 @@
           <a:p>
             <a:fld id="{7C83E2A3-B24E-4406-8D12-05C9EB45BDB5}" type="datetimeFigureOut">
               <a:rPr lang="zh-TW" altLang="en-US" smtClean="0"/>
-              <a:t>2015/5/27</a:t>
+              <a:t>2015/5/28</a:t>
             </a:fld>
             <a:endParaRPr lang="zh-TW" altLang="en-US"/>
           </a:p>
@@ -3040,7 +3050,7 @@
           <a:p>
             <a:fld id="{7C83E2A3-B24E-4406-8D12-05C9EB45BDB5}" type="datetimeFigureOut">
               <a:rPr lang="zh-TW" altLang="en-US" smtClean="0"/>
-              <a:t>2015/5/27</a:t>
+              <a:t>2015/5/28</a:t>
             </a:fld>
             <a:endParaRPr lang="zh-TW" altLang="en-US"/>
           </a:p>
@@ -3515,6 +3525,223 @@
 </p:sld>
 </file>
 
+<file path=ppt/slides/slide10.xml><?xml version="1.0" encoding="utf-8"?>
+<p:sld xmlns:a="http://schemas.openxmlformats.org/drawingml/2006/main" xmlns:r="http://schemas.openxmlformats.org/officeDocument/2006/relationships" xmlns:p="http://schemas.openxmlformats.org/presentationml/2006/main">
+  <p:cSld>
+    <p:spTree>
+      <p:nvGrpSpPr>
+        <p:cNvPr id="1" name=""/>
+        <p:cNvGrpSpPr/>
+        <p:nvPr/>
+      </p:nvGrpSpPr>
+      <p:grpSpPr>
+        <a:xfrm>
+          <a:off x="0" y="0"/>
+          <a:ext cx="0" cy="0"/>
+          <a:chOff x="0" y="0"/>
+          <a:chExt cx="0" cy="0"/>
+        </a:xfrm>
+      </p:grpSpPr>
+      <p:sp>
+        <p:nvSpPr>
+          <p:cNvPr id="2" name="標題 1"/>
+          <p:cNvSpPr>
+            <a:spLocks noGrp="1"/>
+          </p:cNvSpPr>
+          <p:nvPr>
+            <p:ph type="title"/>
+          </p:nvPr>
+        </p:nvSpPr>
+        <p:spPr/>
+        <p:txBody>
+          <a:bodyPr/>
+          <a:lstStyle/>
+          <a:p>
+            <a:r>
+              <a:rPr lang="en-US" altLang="zh-TW" dirty="0" smtClean="0"/>
+              <a:t>Refactor</a:t>
+            </a:r>
+            <a:endParaRPr lang="zh-TW" altLang="en-US" dirty="0"/>
+          </a:p>
+        </p:txBody>
+      </p:sp>
+      <p:sp>
+        <p:nvSpPr>
+          <p:cNvPr id="3" name="內容版面配置區 2"/>
+          <p:cNvSpPr>
+            <a:spLocks noGrp="1"/>
+          </p:cNvSpPr>
+          <p:nvPr>
+            <p:ph idx="1"/>
+          </p:nvPr>
+        </p:nvSpPr>
+        <p:spPr/>
+        <p:txBody>
+          <a:bodyPr/>
+          <a:lstStyle/>
+          <a:p>
+            <a:r>
+              <a:rPr lang="en-US" altLang="zh-TW" dirty="0" smtClean="0"/>
+              <a:t>Code coverage only 55%</a:t>
+            </a:r>
+          </a:p>
+          <a:p>
+            <a:r>
+              <a:rPr lang="en-US" altLang="zh-TW" dirty="0" err="1" smtClean="0"/>
+              <a:t>RuleBase</a:t>
+            </a:r>
+            <a:r>
+              <a:rPr lang="en-US" altLang="zh-TW" dirty="0" smtClean="0"/>
+              <a:t> and </a:t>
+            </a:r>
+            <a:r>
+              <a:rPr lang="en-US" altLang="zh-TW" dirty="0" err="1" smtClean="0"/>
+              <a:t>RuleGUI</a:t>
+            </a:r>
+            <a:r>
+              <a:rPr lang="en-US" altLang="zh-TW" dirty="0" smtClean="0"/>
+              <a:t> below 50%</a:t>
+            </a:r>
+            <a:endParaRPr lang="zh-TW" altLang="en-US" dirty="0"/>
+          </a:p>
+        </p:txBody>
+      </p:sp>
+    </p:spTree>
+    <p:extLst>
+      <p:ext uri="{BB962C8B-B14F-4D97-AF65-F5344CB8AC3E}">
+        <p14:creationId xmlns:p14="http://schemas.microsoft.com/office/powerpoint/2010/main" val="1893286208"/>
+      </p:ext>
+    </p:extLst>
+  </p:cSld>
+  <p:clrMapOvr>
+    <a:masterClrMapping/>
+  </p:clrMapOvr>
+  <p:timing>
+    <p:tnLst>
+      <p:par>
+        <p:cTn id="1" dur="indefinite" restart="never" nodeType="tmRoot"/>
+      </p:par>
+    </p:tnLst>
+  </p:timing>
+</p:sld>
+</file>
+
+<file path=ppt/slides/slide11.xml><?xml version="1.0" encoding="utf-8"?>
+<p:sld xmlns:a="http://schemas.openxmlformats.org/drawingml/2006/main" xmlns:r="http://schemas.openxmlformats.org/officeDocument/2006/relationships" xmlns:p="http://schemas.openxmlformats.org/presentationml/2006/main">
+  <p:cSld>
+    <p:spTree>
+      <p:nvGrpSpPr>
+        <p:cNvPr id="1" name=""/>
+        <p:cNvGrpSpPr/>
+        <p:nvPr/>
+      </p:nvGrpSpPr>
+      <p:grpSpPr>
+        <a:xfrm>
+          <a:off x="0" y="0"/>
+          <a:ext cx="0" cy="0"/>
+          <a:chOff x="0" y="0"/>
+          <a:chExt cx="0" cy="0"/>
+        </a:xfrm>
+      </p:grpSpPr>
+      <p:sp>
+        <p:nvSpPr>
+          <p:cNvPr id="2" name="標題 1"/>
+          <p:cNvSpPr>
+            <a:spLocks noGrp="1"/>
+          </p:cNvSpPr>
+          <p:nvPr>
+            <p:ph type="title"/>
+          </p:nvPr>
+        </p:nvSpPr>
+        <p:spPr/>
+        <p:txBody>
+          <a:bodyPr/>
+          <a:lstStyle/>
+          <a:p>
+            <a:r>
+              <a:rPr lang="en-US" altLang="zh-TW" dirty="0" smtClean="0"/>
+              <a:t>Terminology</a:t>
+            </a:r>
+            <a:endParaRPr lang="zh-TW" altLang="en-US" dirty="0"/>
+          </a:p>
+        </p:txBody>
+      </p:sp>
+      <p:sp>
+        <p:nvSpPr>
+          <p:cNvPr id="3" name="內容版面配置區 2"/>
+          <p:cNvSpPr>
+            <a:spLocks noGrp="1"/>
+          </p:cNvSpPr>
+          <p:nvPr>
+            <p:ph idx="1"/>
+          </p:nvPr>
+        </p:nvSpPr>
+        <p:spPr/>
+        <p:txBody>
+          <a:bodyPr/>
+          <a:lstStyle/>
+          <a:p>
+            <a:r>
+              <a:rPr lang="en-US" altLang="zh-TW" dirty="0" err="1" smtClean="0"/>
+              <a:t>Joda</a:t>
+            </a:r>
+            <a:r>
+              <a:rPr lang="en-US" altLang="zh-TW" dirty="0"/>
+              <a:t>-Time http://www.joda.org/joda-time/</a:t>
+            </a:r>
+            <a:endParaRPr lang="zh-TW" altLang="en-US" dirty="0"/>
+          </a:p>
+        </p:txBody>
+      </p:sp>
+      <p:pic>
+        <p:nvPicPr>
+          <p:cNvPr id="4" name="內容版面配置區 5" descr="google/guava - Mozilla Firefox"/>
+          <p:cNvPicPr>
+            <a:picLocks noChangeAspect="1"/>
+          </p:cNvPicPr>
+          <p:nvPr/>
+        </p:nvPicPr>
+        <p:blipFill rotWithShape="1">
+          <a:blip r:embed="rId3">
+            <a:extLst>
+              <a:ext uri="{28A0092B-C50C-407E-A947-70E740481C1C}">
+                <a14:useLocalDpi xmlns:a14="http://schemas.microsoft.com/office/drawing/2010/main" val="0"/>
+              </a:ext>
+            </a:extLst>
+          </a:blip>
+          <a:srcRect l="13269" t="14466" r="31179"/>
+          <a:stretch/>
+        </p:blipFill>
+        <p:spPr>
+          <a:xfrm>
+            <a:off x="1015620" y="3260181"/>
+            <a:ext cx="6233853" cy="5167312"/>
+          </a:xfrm>
+          <a:prstGeom prst="rect">
+            <a:avLst/>
+          </a:prstGeom>
+        </p:spPr>
+      </p:pic>
+    </p:spTree>
+    <p:extLst>
+      <p:ext uri="{BB962C8B-B14F-4D97-AF65-F5344CB8AC3E}">
+        <p14:creationId xmlns:p14="http://schemas.microsoft.com/office/powerpoint/2010/main" val="1571595447"/>
+      </p:ext>
+    </p:extLst>
+  </p:cSld>
+  <p:clrMapOvr>
+    <a:masterClrMapping/>
+  </p:clrMapOvr>
+  <p:timing>
+    <p:tnLst>
+      <p:par>
+        <p:cTn id="1" dur="indefinite" restart="never" nodeType="tmRoot"/>
+      </p:par>
+    </p:tnLst>
+  </p:timing>
+</p:sld>
+</file>
+
 <file path=ppt/slides/slide2.xml><?xml version="1.0" encoding="utf-8"?>
 <p:sld xmlns:a="http://schemas.openxmlformats.org/drawingml/2006/main" xmlns:r="http://schemas.openxmlformats.org/officeDocument/2006/relationships" xmlns:p="http://schemas.openxmlformats.org/presentationml/2006/main">
   <p:cSld>
@@ -3578,7 +3805,26 @@
           <a:p>
             <a:r>
               <a:rPr lang="en-US" altLang="zh-TW" dirty="0" smtClean="0"/>
+              <a:t>Flow</a:t>
+            </a:r>
+            <a:endParaRPr lang="en-US" altLang="zh-TW" dirty="0" smtClean="0"/>
+          </a:p>
+          <a:p>
+            <a:r>
+              <a:rPr lang="en-US" altLang="zh-TW" dirty="0" smtClean="0"/>
               <a:t>Architecture</a:t>
+            </a:r>
+          </a:p>
+          <a:p>
+            <a:r>
+              <a:rPr lang="en-US" altLang="zh-TW" dirty="0" smtClean="0"/>
+              <a:t>Coverage</a:t>
+            </a:r>
+          </a:p>
+          <a:p>
+            <a:r>
+              <a:rPr lang="en-US" altLang="zh-TW" dirty="0" smtClean="0"/>
+              <a:t>Refactor</a:t>
             </a:r>
             <a:endParaRPr lang="en-US" altLang="zh-TW" dirty="0" smtClean="0"/>
           </a:p>
@@ -3834,6 +4080,13 @@
   <p:clrMapOvr>
     <a:masterClrMapping/>
   </p:clrMapOvr>
+  <p:timing>
+    <p:tnLst>
+      <p:par>
+        <p:cTn id="1" dur="indefinite" restart="never" nodeType="tmRoot"/>
+      </p:par>
+    </p:tnLst>
+  </p:timing>
 </p:sld>
 </file>
 
@@ -3919,8 +4172,38 @@
           </a:p>
           <a:p>
             <a:r>
-              <a:rPr lang="en-US" altLang="zh-TW" smtClean="0"/>
+              <a:rPr lang="en-US" altLang="zh-TW" dirty="0" smtClean="0"/>
               <a:t>Grouping</a:t>
+            </a:r>
+          </a:p>
+          <a:p>
+            <a:r>
+              <a:rPr lang="en-US" altLang="zh-TW" dirty="0"/>
+              <a:t>{</a:t>
+            </a:r>
+            <a:r>
+              <a:rPr lang="zh-TW" altLang="en-US" dirty="0"/>
+              <a:t>品</a:t>
+            </a:r>
+            <a:r>
+              <a:rPr lang="en-US" altLang="zh-TW" dirty="0"/>
+              <a:t>p,</a:t>
+            </a:r>
+            <a:r>
+              <a:rPr lang="zh-TW" altLang="en-US" dirty="0"/>
+              <a:t>品</a:t>
+            </a:r>
+            <a:r>
+              <a:rPr lang="en-US" altLang="zh-TW" dirty="0"/>
+              <a:t>q,</a:t>
+            </a:r>
+            <a:r>
+              <a:rPr lang="zh-TW" altLang="en-US" dirty="0"/>
+              <a:t>品</a:t>
+            </a:r>
+            <a:r>
+              <a:rPr lang="en-US" altLang="zh-TW" dirty="0"/>
+              <a:t>r}</a:t>
             </a:r>
             <a:endParaRPr lang="en-US" altLang="zh-TW" dirty="0" smtClean="0"/>
           </a:p>
@@ -3936,6 +4219,122 @@
   <p:clrMapOvr>
     <a:masterClrMapping/>
   </p:clrMapOvr>
+  <p:timing>
+    <p:tnLst>
+      <p:par>
+        <p:cTn id="1" dur="indefinite" restart="never" nodeType="tmRoot">
+          <p:childTnLst>
+            <p:seq concurrent="1" nextAc="seek">
+              <p:cTn id="2" dur="indefinite" nodeType="mainSeq">
+                <p:childTnLst>
+                  <p:par>
+                    <p:cTn id="3" fill="hold">
+                      <p:stCondLst>
+                        <p:cond delay="indefinite"/>
+                      </p:stCondLst>
+                      <p:childTnLst>
+                        <p:par>
+                          <p:cTn id="4" fill="hold">
+                            <p:stCondLst>
+                              <p:cond delay="0"/>
+                            </p:stCondLst>
+                            <p:childTnLst>
+                              <p:par>
+                                <p:cTn id="5" presetID="26" presetClass="emph" presetSubtype="0" fill="hold" nodeType="clickEffect">
+                                  <p:stCondLst>
+                                    <p:cond delay="0"/>
+                                  </p:stCondLst>
+                                  <p:childTnLst>
+                                    <p:animEffect transition="out" filter="fade">
+                                      <p:cBhvr>
+                                        <p:cTn id="6" dur="500" tmFilter="0, 0; .2, .5; .8, .5; 1, 0"/>
+                                        <p:tgtEl>
+                                          <p:spTgt spid="3">
+                                            <p:txEl>
+                                              <p:pRg st="1" end="1"/>
+                                            </p:txEl>
+                                          </p:spTgt>
+                                        </p:tgtEl>
+                                      </p:cBhvr>
+                                    </p:animEffect>
+                                    <p:animScale>
+                                      <p:cBhvr>
+                                        <p:cTn id="7" dur="250" autoRev="1" fill="hold"/>
+                                        <p:tgtEl>
+                                          <p:spTgt spid="3">
+                                            <p:txEl>
+                                              <p:pRg st="1" end="1"/>
+                                            </p:txEl>
+                                          </p:spTgt>
+                                        </p:tgtEl>
+                                      </p:cBhvr>
+                                      <p:by x="105000" y="105000"/>
+                                    </p:animScale>
+                                  </p:childTnLst>
+                                </p:cTn>
+                              </p:par>
+                              <p:par>
+                                <p:cTn id="8" presetID="26" presetClass="emph" presetSubtype="0" fill="hold" nodeType="withEffect">
+                                  <p:stCondLst>
+                                    <p:cond delay="0"/>
+                                  </p:stCondLst>
+                                  <p:childTnLst>
+                                    <p:animEffect transition="out" filter="fade">
+                                      <p:cBhvr>
+                                        <p:cTn id="9" dur="500" tmFilter="0, 0; .2, .5; .8, .5; 1, 0"/>
+                                        <p:tgtEl>
+                                          <p:spTgt spid="3">
+                                            <p:txEl>
+                                              <p:pRg st="2" end="2"/>
+                                            </p:txEl>
+                                          </p:spTgt>
+                                        </p:tgtEl>
+                                      </p:cBhvr>
+                                    </p:animEffect>
+                                    <p:animScale>
+                                      <p:cBhvr>
+                                        <p:cTn id="10" dur="250" autoRev="1" fill="hold"/>
+                                        <p:tgtEl>
+                                          <p:spTgt spid="3">
+                                            <p:txEl>
+                                              <p:pRg st="2" end="2"/>
+                                            </p:txEl>
+                                          </p:spTgt>
+                                        </p:tgtEl>
+                                      </p:cBhvr>
+                                      <p:by x="105000" y="105000"/>
+                                    </p:animScale>
+                                  </p:childTnLst>
+                                </p:cTn>
+                              </p:par>
+                            </p:childTnLst>
+                          </p:cTn>
+                        </p:par>
+                      </p:childTnLst>
+                    </p:cTn>
+                  </p:par>
+                </p:childTnLst>
+              </p:cTn>
+              <p:prevCondLst>
+                <p:cond evt="onPrev" delay="0">
+                  <p:tgtEl>
+                    <p:sldTgt/>
+                  </p:tgtEl>
+                </p:cond>
+              </p:prevCondLst>
+              <p:nextCondLst>
+                <p:cond evt="onNext" delay="0">
+                  <p:tgtEl>
+                    <p:sldTgt/>
+                  </p:tgtEl>
+                </p:cond>
+              </p:nextCondLst>
+            </p:seq>
+          </p:childTnLst>
+        </p:cTn>
+      </p:par>
+    </p:tnLst>
+  </p:timing>
 </p:sld>
 </file>
 
@@ -3972,10 +4371,10 @@
           <a:lstStyle/>
           <a:p>
             <a:r>
-              <a:rPr lang="en-US" altLang="zh-TW" dirty="0"/>
-              <a:t>Architecture</a:t>
-            </a:r>
-            <a:endParaRPr lang="zh-TW" altLang="en-US" dirty="0"/>
+              <a:rPr lang="en-US" altLang="zh-TW" smtClean="0"/>
+              <a:t>Flow</a:t>
+            </a:r>
+            <a:endParaRPr lang="zh-TW" altLang="en-US"/>
           </a:p>
         </p:txBody>
       </p:sp>
@@ -4001,13 +4400,20 @@
     </p:spTree>
     <p:extLst>
       <p:ext uri="{BB962C8B-B14F-4D97-AF65-F5344CB8AC3E}">
-        <p14:creationId xmlns:p14="http://schemas.microsoft.com/office/powerpoint/2010/main" val="561929794"/>
+        <p14:creationId xmlns:p14="http://schemas.microsoft.com/office/powerpoint/2010/main" val="3066355624"/>
       </p:ext>
     </p:extLst>
   </p:cSld>
   <p:clrMapOvr>
     <a:masterClrMapping/>
   </p:clrMapOvr>
+  <p:timing>
+    <p:tnLst>
+      <p:par>
+        <p:cTn id="1" dur="indefinite" restart="never" nodeType="tmRoot"/>
+      </p:par>
+    </p:tnLst>
+  </p:timing>
 </p:sld>
 </file>
 
@@ -4028,6 +4434,35 @@
           <a:chExt cx="0" cy="0"/>
         </a:xfrm>
       </p:grpSpPr>
+      <p:pic>
+        <p:nvPicPr>
+          <p:cNvPr id="6" name="內容版面配置區 5"/>
+          <p:cNvPicPr>
+            <a:picLocks noGrp="1" noChangeAspect="1"/>
+          </p:cNvPicPr>
+          <p:nvPr>
+            <p:ph idx="1"/>
+          </p:nvPr>
+        </p:nvPicPr>
+        <p:blipFill>
+          <a:blip r:embed="rId2">
+            <a:extLst>
+              <a:ext uri="{28A0092B-C50C-407E-A947-70E740481C1C}">
+                <a14:useLocalDpi xmlns:a14="http://schemas.microsoft.com/office/drawing/2010/main" val="0"/>
+              </a:ext>
+            </a:extLst>
+          </a:blip>
+          <a:stretch>
+            <a:fillRect/>
+          </a:stretch>
+        </p:blipFill>
+        <p:spPr>
+          <a:xfrm>
+            <a:off x="762463" y="365125"/>
+            <a:ext cx="10667073" cy="6076841"/>
+          </a:xfrm>
+        </p:spPr>
+      </p:pic>
       <p:sp>
         <p:nvSpPr>
           <p:cNvPr id="2" name="標題 1"/>
@@ -4044,35 +4479,8 @@
           <a:lstStyle/>
           <a:p>
             <a:r>
-              <a:rPr lang="en-US" altLang="zh-TW" dirty="0" smtClean="0"/>
-              <a:t>Terminology</a:t>
-            </a:r>
-            <a:endParaRPr lang="zh-TW" altLang="en-US" dirty="0"/>
-          </a:p>
-        </p:txBody>
-      </p:sp>
-      <p:sp>
-        <p:nvSpPr>
-          <p:cNvPr id="3" name="內容版面配置區 2"/>
-          <p:cNvSpPr>
-            <a:spLocks noGrp="1"/>
-          </p:cNvSpPr>
-          <p:nvPr>
-            <p:ph idx="1"/>
-          </p:nvPr>
-        </p:nvSpPr>
-        <p:spPr/>
-        <p:txBody>
-          <a:bodyPr/>
-          <a:lstStyle/>
-          <a:p>
-            <a:r>
-              <a:rPr lang="en-US" altLang="zh-TW" dirty="0" err="1" smtClean="0"/>
-              <a:t>Joda</a:t>
-            </a:r>
-            <a:r>
               <a:rPr lang="en-US" altLang="zh-TW" dirty="0"/>
-              <a:t>-Time http://www.joda.org/joda-time/</a:t>
+              <a:t>Architecture</a:t>
             </a:r>
             <a:endParaRPr lang="zh-TW" altLang="en-US" dirty="0"/>
           </a:p>
@@ -4081,13 +4489,286 @@
     </p:spTree>
     <p:extLst>
       <p:ext uri="{BB962C8B-B14F-4D97-AF65-F5344CB8AC3E}">
-        <p14:creationId xmlns:p14="http://schemas.microsoft.com/office/powerpoint/2010/main" val="1571595447"/>
+        <p14:creationId xmlns:p14="http://schemas.microsoft.com/office/powerpoint/2010/main" val="561929794"/>
       </p:ext>
     </p:extLst>
   </p:cSld>
   <p:clrMapOvr>
     <a:masterClrMapping/>
   </p:clrMapOvr>
+  <p:timing>
+    <p:tnLst>
+      <p:par>
+        <p:cTn id="1" dur="indefinite" restart="never" nodeType="tmRoot"/>
+      </p:par>
+    </p:tnLst>
+  </p:timing>
+</p:sld>
+</file>
+
+<file path=ppt/slides/slide7.xml><?xml version="1.0" encoding="utf-8"?>
+<p:sld xmlns:a="http://schemas.openxmlformats.org/drawingml/2006/main" xmlns:r="http://schemas.openxmlformats.org/officeDocument/2006/relationships" xmlns:p="http://schemas.openxmlformats.org/presentationml/2006/main">
+  <p:cSld>
+    <p:spTree>
+      <p:nvGrpSpPr>
+        <p:cNvPr id="1" name=""/>
+        <p:cNvGrpSpPr/>
+        <p:nvPr/>
+      </p:nvGrpSpPr>
+      <p:grpSpPr>
+        <a:xfrm>
+          <a:off x="0" y="0"/>
+          <a:ext cx="0" cy="0"/>
+          <a:chOff x="0" y="0"/>
+          <a:chExt cx="0" cy="0"/>
+        </a:xfrm>
+      </p:grpSpPr>
+      <p:pic>
+        <p:nvPicPr>
+          <p:cNvPr id="4" name="內容版面配置區 3"/>
+          <p:cNvPicPr>
+            <a:picLocks noGrp="1" noChangeAspect="1"/>
+          </p:cNvPicPr>
+          <p:nvPr>
+            <p:ph idx="1"/>
+          </p:nvPr>
+        </p:nvPicPr>
+        <p:blipFill>
+          <a:blip r:embed="rId2">
+            <a:extLst>
+              <a:ext uri="{28A0092B-C50C-407E-A947-70E740481C1C}">
+                <a14:useLocalDpi xmlns:a14="http://schemas.microsoft.com/office/drawing/2010/main" val="0"/>
+              </a:ext>
+            </a:extLst>
+          </a:blip>
+          <a:stretch>
+            <a:fillRect/>
+          </a:stretch>
+        </p:blipFill>
+        <p:spPr>
+          <a:xfrm>
+            <a:off x="3455869" y="365125"/>
+            <a:ext cx="5280262" cy="5784557"/>
+          </a:xfrm>
+        </p:spPr>
+      </p:pic>
+      <p:sp>
+        <p:nvSpPr>
+          <p:cNvPr id="2" name="標題 1"/>
+          <p:cNvSpPr>
+            <a:spLocks noGrp="1"/>
+          </p:cNvSpPr>
+          <p:nvPr>
+            <p:ph type="title"/>
+          </p:nvPr>
+        </p:nvSpPr>
+        <p:spPr/>
+        <p:txBody>
+          <a:bodyPr/>
+          <a:lstStyle/>
+          <a:p>
+            <a:r>
+              <a:rPr lang="en-US" altLang="zh-TW" dirty="0"/>
+              <a:t>Architecture</a:t>
+            </a:r>
+            <a:endParaRPr lang="zh-TW" altLang="en-US" dirty="0"/>
+          </a:p>
+        </p:txBody>
+      </p:sp>
+    </p:spTree>
+    <p:extLst>
+      <p:ext uri="{BB962C8B-B14F-4D97-AF65-F5344CB8AC3E}">
+        <p14:creationId xmlns:p14="http://schemas.microsoft.com/office/powerpoint/2010/main" val="1133371184"/>
+      </p:ext>
+    </p:extLst>
+  </p:cSld>
+  <p:clrMapOvr>
+    <a:masterClrMapping/>
+  </p:clrMapOvr>
+  <p:timing>
+    <p:tnLst>
+      <p:par>
+        <p:cTn id="1" dur="indefinite" restart="never" nodeType="tmRoot"/>
+      </p:par>
+    </p:tnLst>
+  </p:timing>
+</p:sld>
+</file>
+
+<file path=ppt/slides/slide8.xml><?xml version="1.0" encoding="utf-8"?>
+<p:sld xmlns:a="http://schemas.openxmlformats.org/drawingml/2006/main" xmlns:r="http://schemas.openxmlformats.org/officeDocument/2006/relationships" xmlns:p="http://schemas.openxmlformats.org/presentationml/2006/main">
+  <p:cSld>
+    <p:spTree>
+      <p:nvGrpSpPr>
+        <p:cNvPr id="1" name=""/>
+        <p:cNvGrpSpPr/>
+        <p:nvPr/>
+      </p:nvGrpSpPr>
+      <p:grpSpPr>
+        <a:xfrm>
+          <a:off x="0" y="0"/>
+          <a:ext cx="0" cy="0"/>
+          <a:chOff x="0" y="0"/>
+          <a:chExt cx="0" cy="0"/>
+        </a:xfrm>
+      </p:grpSpPr>
+      <p:sp>
+        <p:nvSpPr>
+          <p:cNvPr id="2" name="標題 1"/>
+          <p:cNvSpPr>
+            <a:spLocks noGrp="1"/>
+          </p:cNvSpPr>
+          <p:nvPr>
+            <p:ph type="title"/>
+          </p:nvPr>
+        </p:nvSpPr>
+        <p:spPr/>
+        <p:txBody>
+          <a:bodyPr/>
+          <a:lstStyle/>
+          <a:p>
+            <a:r>
+              <a:rPr lang="en-US" altLang="zh-TW" dirty="0"/>
+              <a:t>Architecture</a:t>
+            </a:r>
+            <a:endParaRPr lang="zh-TW" altLang="en-US" dirty="0"/>
+          </a:p>
+        </p:txBody>
+      </p:sp>
+      <p:pic>
+        <p:nvPicPr>
+          <p:cNvPr id="4" name="內容版面配置區 3"/>
+          <p:cNvPicPr>
+            <a:picLocks noGrp="1" noChangeAspect="1"/>
+          </p:cNvPicPr>
+          <p:nvPr>
+            <p:ph idx="1"/>
+          </p:nvPr>
+        </p:nvPicPr>
+        <p:blipFill>
+          <a:blip r:embed="rId2">
+            <a:extLst>
+              <a:ext uri="{28A0092B-C50C-407E-A947-70E740481C1C}">
+                <a14:useLocalDpi xmlns:a14="http://schemas.microsoft.com/office/drawing/2010/main" val="0"/>
+              </a:ext>
+            </a:extLst>
+          </a:blip>
+          <a:stretch>
+            <a:fillRect/>
+          </a:stretch>
+        </p:blipFill>
+        <p:spPr>
+          <a:xfrm>
+            <a:off x="2304943" y="1690688"/>
+            <a:ext cx="7582113" cy="4719356"/>
+          </a:xfrm>
+        </p:spPr>
+      </p:pic>
+    </p:spTree>
+    <p:extLst>
+      <p:ext uri="{BB962C8B-B14F-4D97-AF65-F5344CB8AC3E}">
+        <p14:creationId xmlns:p14="http://schemas.microsoft.com/office/powerpoint/2010/main" val="3626491477"/>
+      </p:ext>
+    </p:extLst>
+  </p:cSld>
+  <p:clrMapOvr>
+    <a:masterClrMapping/>
+  </p:clrMapOvr>
+  <p:timing>
+    <p:tnLst>
+      <p:par>
+        <p:cTn id="1" dur="indefinite" restart="never" nodeType="tmRoot"/>
+      </p:par>
+    </p:tnLst>
+  </p:timing>
+</p:sld>
+</file>
+
+<file path=ppt/slides/slide9.xml><?xml version="1.0" encoding="utf-8"?>
+<p:sld xmlns:a="http://schemas.openxmlformats.org/drawingml/2006/main" xmlns:r="http://schemas.openxmlformats.org/officeDocument/2006/relationships" xmlns:p="http://schemas.openxmlformats.org/presentationml/2006/main">
+  <p:cSld>
+    <p:spTree>
+      <p:nvGrpSpPr>
+        <p:cNvPr id="1" name=""/>
+        <p:cNvGrpSpPr/>
+        <p:nvPr/>
+      </p:nvGrpSpPr>
+      <p:grpSpPr>
+        <a:xfrm>
+          <a:off x="0" y="0"/>
+          <a:ext cx="0" cy="0"/>
+          <a:chOff x="0" y="0"/>
+          <a:chExt cx="0" cy="0"/>
+        </a:xfrm>
+      </p:grpSpPr>
+      <p:sp>
+        <p:nvSpPr>
+          <p:cNvPr id="2" name="標題 1"/>
+          <p:cNvSpPr>
+            <a:spLocks noGrp="1"/>
+          </p:cNvSpPr>
+          <p:nvPr>
+            <p:ph type="title"/>
+          </p:nvPr>
+        </p:nvSpPr>
+        <p:spPr/>
+        <p:txBody>
+          <a:bodyPr/>
+          <a:lstStyle/>
+          <a:p>
+            <a:r>
+              <a:rPr lang="en-US" altLang="zh-TW" dirty="0" smtClean="0"/>
+              <a:t>Coverage</a:t>
+            </a:r>
+            <a:endParaRPr lang="zh-TW" altLang="en-US" dirty="0"/>
+          </a:p>
+        </p:txBody>
+      </p:sp>
+      <p:pic>
+        <p:nvPicPr>
+          <p:cNvPr id="4" name="內容版面配置區 3" descr="Java - ShoppingCart/src/model/probability/ProbabilityBase.java - Eclipse"/>
+          <p:cNvPicPr>
+            <a:picLocks noGrp="1" noChangeAspect="1"/>
+          </p:cNvPicPr>
+          <p:nvPr>
+            <p:ph idx="1"/>
+          </p:nvPr>
+        </p:nvPicPr>
+        <p:blipFill rotWithShape="1">
+          <a:blip r:embed="rId2">
+            <a:extLst>
+              <a:ext uri="{28A0092B-C50C-407E-A947-70E740481C1C}">
+                <a14:useLocalDpi xmlns:a14="http://schemas.microsoft.com/office/drawing/2010/main" val="0"/>
+              </a:ext>
+            </a:extLst>
+          </a:blip>
+          <a:srcRect l="2271" t="29243" r="43359" b="5205"/>
+          <a:stretch/>
+        </p:blipFill>
+        <p:spPr>
+          <a:xfrm>
+            <a:off x="838200" y="1319048"/>
+            <a:ext cx="9805813" cy="6364642"/>
+          </a:xfrm>
+        </p:spPr>
+      </p:pic>
+    </p:spTree>
+    <p:extLst>
+      <p:ext uri="{BB962C8B-B14F-4D97-AF65-F5344CB8AC3E}">
+        <p14:creationId xmlns:p14="http://schemas.microsoft.com/office/powerpoint/2010/main" val="4176775056"/>
+      </p:ext>
+    </p:extLst>
+  </p:cSld>
+  <p:clrMapOvr>
+    <a:masterClrMapping/>
+  </p:clrMapOvr>
+  <p:timing>
+    <p:tnLst>
+      <p:par>
+        <p:cTn id="1" dur="indefinite" restart="never" nodeType="tmRoot"/>
+      </p:par>
+    </p:tnLst>
+  </p:timing>
 </p:sld>
 </file>
 

</xml_diff>

<commit_message>
2015/5/28 Add E-mail function with gmail account not attached
</commit_message>
<xml_diff>
--- a/DM_PJ03_Probability.pptx
+++ b/DM_PJ03_Probability.pptx
@@ -5,7 +5,7 @@
     <p:sldMasterId id="2147483648" r:id="rId1"/>
   </p:sldMasterIdLst>
   <p:notesMasterIdLst>
-    <p:notesMasterId r:id="rId13"/>
+    <p:notesMasterId r:id="rId17"/>
   </p:notesMasterIdLst>
   <p:sldIdLst>
     <p:sldId id="256" r:id="rId2"/>
@@ -19,6 +19,10 @@
     <p:sldId id="262" r:id="rId10"/>
     <p:sldId id="263" r:id="rId11"/>
     <p:sldId id="258" r:id="rId12"/>
+    <p:sldId id="267" r:id="rId13"/>
+    <p:sldId id="268" r:id="rId14"/>
+    <p:sldId id="269" r:id="rId15"/>
+    <p:sldId id="270" r:id="rId16"/>
   </p:sldIdLst>
   <p:sldSz cx="12192000" cy="6858000"/>
   <p:notesSz cx="6858000" cy="9144000"/>
@@ -133,6 +137,10 @@
             <p14:sldId id="262"/>
             <p14:sldId id="263"/>
             <p14:sldId id="258"/>
+            <p14:sldId id="267"/>
+            <p14:sldId id="268"/>
+            <p14:sldId id="269"/>
+            <p14:sldId id="270"/>
           </p14:sldIdLst>
         </p14:section>
       </p14:sectionLst>
@@ -3687,7 +3695,52 @@
             </a:r>
             <a:r>
               <a:rPr lang="en-US" altLang="zh-TW" dirty="0"/>
-              <a:t>-Time http://www.joda.org/joda-time/</a:t>
+              <a:t>-Time </a:t>
+            </a:r>
+            <a:r>
+              <a:rPr lang="en-US" altLang="zh-TW" dirty="0">
+                <a:hlinkClick r:id="rId3"/>
+              </a:rPr>
+              <a:t>http://www.joda.org/joda-time</a:t>
+            </a:r>
+            <a:r>
+              <a:rPr lang="en-US" altLang="zh-TW" dirty="0" smtClean="0">
+                <a:hlinkClick r:id="rId3"/>
+              </a:rPr>
+              <a:t>/</a:t>
+            </a:r>
+            <a:endParaRPr lang="en-US" altLang="zh-TW" dirty="0" smtClean="0"/>
+          </a:p>
+          <a:p>
+            <a:r>
+              <a:rPr lang="en-US" altLang="zh-TW" dirty="0" err="1" smtClean="0"/>
+              <a:t>Javax.mail</a:t>
+            </a:r>
+            <a:endParaRPr lang="en-US" altLang="zh-TW" dirty="0" smtClean="0"/>
+          </a:p>
+          <a:p>
+            <a:r>
+              <a:rPr lang="en-US" altLang="zh-TW" dirty="0" smtClean="0"/>
+              <a:t>JAF (</a:t>
+            </a:r>
+            <a:r>
+              <a:rPr lang="en-US" altLang="zh-TW" dirty="0" smtClean="0"/>
+              <a:t>JavaBeans </a:t>
+            </a:r>
+            <a:r>
+              <a:rPr lang="en-US" altLang="zh-TW" dirty="0"/>
+              <a:t>Activation </a:t>
+            </a:r>
+            <a:r>
+              <a:rPr lang="en-US" altLang="zh-TW" dirty="0" smtClean="0"/>
+              <a:t>Framework)</a:t>
+            </a:r>
+            <a:endParaRPr lang="en-US" altLang="zh-TW" dirty="0" smtClean="0"/>
+          </a:p>
+          <a:p>
+            <a:r>
+              <a:rPr lang="en-US" altLang="zh-TW" dirty="0" smtClean="0"/>
+              <a:t>Guava</a:t>
             </a:r>
             <a:endParaRPr lang="zh-TW" altLang="en-US" dirty="0"/>
           </a:p>
@@ -3702,7 +3755,7 @@
           <p:nvPr/>
         </p:nvPicPr>
         <p:blipFill rotWithShape="1">
-          <a:blip r:embed="rId3">
+          <a:blip r:embed="rId4">
             <a:extLst>
               <a:ext uri="{28A0092B-C50C-407E-A947-70E740481C1C}">
                 <a14:useLocalDpi xmlns:a14="http://schemas.microsoft.com/office/drawing/2010/main" val="0"/>
@@ -3714,7 +3767,7 @@
         </p:blipFill>
         <p:spPr>
           <a:xfrm>
-            <a:off x="1015620" y="3260181"/>
+            <a:off x="1029268" y="4001294"/>
             <a:ext cx="6233853" cy="5167312"/>
           </a:xfrm>
           <a:prstGeom prst="rect">
@@ -3742,6 +3795,438 @@
 </p:sld>
 </file>
 
+<file path=ppt/slides/slide12.xml><?xml version="1.0" encoding="utf-8"?>
+<p:sld xmlns:a="http://schemas.openxmlformats.org/drawingml/2006/main" xmlns:r="http://schemas.openxmlformats.org/officeDocument/2006/relationships" xmlns:p="http://schemas.openxmlformats.org/presentationml/2006/main">
+  <p:cSld>
+    <p:spTree>
+      <p:nvGrpSpPr>
+        <p:cNvPr id="1" name=""/>
+        <p:cNvGrpSpPr/>
+        <p:nvPr/>
+      </p:nvGrpSpPr>
+      <p:grpSpPr>
+        <a:xfrm>
+          <a:off x="0" y="0"/>
+          <a:ext cx="0" cy="0"/>
+          <a:chOff x="0" y="0"/>
+          <a:chExt cx="0" cy="0"/>
+        </a:xfrm>
+      </p:grpSpPr>
+      <p:sp>
+        <p:nvSpPr>
+          <p:cNvPr id="2" name="標題 1"/>
+          <p:cNvSpPr>
+            <a:spLocks noGrp="1"/>
+          </p:cNvSpPr>
+          <p:nvPr>
+            <p:ph type="title"/>
+          </p:nvPr>
+        </p:nvSpPr>
+        <p:spPr/>
+        <p:txBody>
+          <a:bodyPr/>
+          <a:lstStyle/>
+          <a:p>
+            <a:r>
+              <a:rPr lang="en-US" altLang="zh-TW" dirty="0" smtClean="0"/>
+              <a:t>Question</a:t>
+            </a:r>
+            <a:endParaRPr lang="zh-TW" altLang="en-US" dirty="0"/>
+          </a:p>
+        </p:txBody>
+      </p:sp>
+      <p:sp>
+        <p:nvSpPr>
+          <p:cNvPr id="3" name="內容版面配置區 2"/>
+          <p:cNvSpPr>
+            <a:spLocks noGrp="1"/>
+          </p:cNvSpPr>
+          <p:nvPr>
+            <p:ph idx="1"/>
+          </p:nvPr>
+        </p:nvSpPr>
+        <p:spPr/>
+        <p:txBody>
+          <a:bodyPr/>
+          <a:lstStyle/>
+          <a:p>
+            <a:r>
+              <a:rPr lang="en-US" altLang="zh-TW" dirty="0" smtClean="0"/>
+              <a:t>How about generate a list over 10000?</a:t>
+            </a:r>
+          </a:p>
+          <a:p>
+            <a:endParaRPr lang="zh-TW" altLang="en-US" dirty="0"/>
+          </a:p>
+        </p:txBody>
+      </p:sp>
+      <p:pic>
+        <p:nvPicPr>
+          <p:cNvPr id="4" name="圖片 3" descr="D:\Computer\Git\ShoppingCart\buy4.csv - Sublime Text (UNREGISTERED)"/>
+          <p:cNvPicPr>
+            <a:picLocks noChangeAspect="1"/>
+          </p:cNvPicPr>
+          <p:nvPr/>
+        </p:nvPicPr>
+        <p:blipFill rotWithShape="1">
+          <a:blip r:embed="rId2">
+            <a:extLst>
+              <a:ext uri="{28A0092B-C50C-407E-A947-70E740481C1C}">
+                <a14:useLocalDpi xmlns:a14="http://schemas.microsoft.com/office/drawing/2010/main" val="0"/>
+              </a:ext>
+            </a:extLst>
+          </a:blip>
+          <a:srcRect r="67024"/>
+          <a:stretch/>
+        </p:blipFill>
+        <p:spPr>
+          <a:xfrm>
+            <a:off x="838200" y="2317211"/>
+            <a:ext cx="4020403" cy="6563566"/>
+          </a:xfrm>
+          <a:prstGeom prst="rect">
+            <a:avLst/>
+          </a:prstGeom>
+        </p:spPr>
+      </p:pic>
+      <p:pic>
+        <p:nvPicPr>
+          <p:cNvPr id="5" name="圖片 4" descr="D:\Computer\Git\ShoppingCart\buy4.csv - Sublime Text (UNREGISTERED)"/>
+          <p:cNvPicPr>
+            <a:picLocks noChangeAspect="1"/>
+          </p:cNvPicPr>
+          <p:nvPr/>
+        </p:nvPicPr>
+        <p:blipFill rotWithShape="1">
+          <a:blip r:embed="rId3">
+            <a:extLst>
+              <a:ext uri="{28A0092B-C50C-407E-A947-70E740481C1C}">
+                <a14:useLocalDpi xmlns:a14="http://schemas.microsoft.com/office/drawing/2010/main" val="0"/>
+              </a:ext>
+            </a:extLst>
+          </a:blip>
+          <a:srcRect r="49627"/>
+          <a:stretch/>
+        </p:blipFill>
+        <p:spPr>
+          <a:xfrm>
+            <a:off x="4858603" y="2317211"/>
+            <a:ext cx="6141493" cy="6563566"/>
+          </a:xfrm>
+          <a:prstGeom prst="rect">
+            <a:avLst/>
+          </a:prstGeom>
+        </p:spPr>
+      </p:pic>
+    </p:spTree>
+    <p:extLst>
+      <p:ext uri="{BB962C8B-B14F-4D97-AF65-F5344CB8AC3E}">
+        <p14:creationId xmlns:p14="http://schemas.microsoft.com/office/powerpoint/2010/main" val="1604245727"/>
+      </p:ext>
+    </p:extLst>
+  </p:cSld>
+  <p:clrMapOvr>
+    <a:masterClrMapping/>
+  </p:clrMapOvr>
+</p:sld>
+</file>
+
+<file path=ppt/slides/slide13.xml><?xml version="1.0" encoding="utf-8"?>
+<p:sld xmlns:a="http://schemas.openxmlformats.org/drawingml/2006/main" xmlns:r="http://schemas.openxmlformats.org/officeDocument/2006/relationships" xmlns:p="http://schemas.openxmlformats.org/presentationml/2006/main">
+  <p:cSld>
+    <p:spTree>
+      <p:nvGrpSpPr>
+        <p:cNvPr id="1" name=""/>
+        <p:cNvGrpSpPr/>
+        <p:nvPr/>
+      </p:nvGrpSpPr>
+      <p:grpSpPr>
+        <a:xfrm>
+          <a:off x="0" y="0"/>
+          <a:ext cx="0" cy="0"/>
+          <a:chOff x="0" y="0"/>
+          <a:chExt cx="0" cy="0"/>
+        </a:xfrm>
+      </p:grpSpPr>
+      <p:sp>
+        <p:nvSpPr>
+          <p:cNvPr id="2" name="標題 1"/>
+          <p:cNvSpPr>
+            <a:spLocks noGrp="1"/>
+          </p:cNvSpPr>
+          <p:nvPr>
+            <p:ph type="title"/>
+          </p:nvPr>
+        </p:nvSpPr>
+        <p:spPr/>
+        <p:txBody>
+          <a:bodyPr/>
+          <a:lstStyle/>
+          <a:p>
+            <a:r>
+              <a:rPr lang="en-US" altLang="zh-TW" dirty="0"/>
+              <a:t>Question</a:t>
+            </a:r>
+            <a:endParaRPr lang="zh-TW" altLang="en-US" dirty="0"/>
+          </a:p>
+        </p:txBody>
+      </p:sp>
+      <p:pic>
+        <p:nvPicPr>
+          <p:cNvPr id="4" name="內容版面配置區 3" descr="Java - ShoppingCart/src/controller/console/ConsoleCall.java - Eclipse"/>
+          <p:cNvPicPr>
+            <a:picLocks noGrp="1" noChangeAspect="1"/>
+          </p:cNvPicPr>
+          <p:nvPr>
+            <p:ph idx="1"/>
+          </p:nvPr>
+        </p:nvPicPr>
+        <p:blipFill rotWithShape="1">
+          <a:blip r:embed="rId2">
+            <a:extLst>
+              <a:ext uri="{28A0092B-C50C-407E-A947-70E740481C1C}">
+                <a14:useLocalDpi xmlns:a14="http://schemas.microsoft.com/office/drawing/2010/main" val="0"/>
+              </a:ext>
+            </a:extLst>
+          </a:blip>
+          <a:srcRect l="20867" t="35708" r="20204" b="7711"/>
+          <a:stretch/>
+        </p:blipFill>
+        <p:spPr>
+          <a:xfrm>
+            <a:off x="838200" y="1690688"/>
+            <a:ext cx="9996823" cy="5167312"/>
+          </a:xfrm>
+        </p:spPr>
+      </p:pic>
+    </p:spTree>
+    <p:extLst>
+      <p:ext uri="{BB962C8B-B14F-4D97-AF65-F5344CB8AC3E}">
+        <p14:creationId xmlns:p14="http://schemas.microsoft.com/office/powerpoint/2010/main" val="2657958367"/>
+      </p:ext>
+    </p:extLst>
+  </p:cSld>
+  <p:clrMapOvr>
+    <a:masterClrMapping/>
+  </p:clrMapOvr>
+</p:sld>
+</file>
+
+<file path=ppt/slides/slide14.xml><?xml version="1.0" encoding="utf-8"?>
+<p:sld xmlns:a="http://schemas.openxmlformats.org/drawingml/2006/main" xmlns:r="http://schemas.openxmlformats.org/officeDocument/2006/relationships" xmlns:p="http://schemas.openxmlformats.org/presentationml/2006/main">
+  <p:cSld>
+    <p:spTree>
+      <p:nvGrpSpPr>
+        <p:cNvPr id="1" name=""/>
+        <p:cNvGrpSpPr/>
+        <p:nvPr/>
+      </p:nvGrpSpPr>
+      <p:grpSpPr>
+        <a:xfrm>
+          <a:off x="0" y="0"/>
+          <a:ext cx="0" cy="0"/>
+          <a:chOff x="0" y="0"/>
+          <a:chExt cx="0" cy="0"/>
+        </a:xfrm>
+      </p:grpSpPr>
+      <p:sp>
+        <p:nvSpPr>
+          <p:cNvPr id="2" name="標題 1"/>
+          <p:cNvSpPr>
+            <a:spLocks noGrp="1"/>
+          </p:cNvSpPr>
+          <p:nvPr>
+            <p:ph type="title"/>
+          </p:nvPr>
+        </p:nvSpPr>
+        <p:spPr/>
+        <p:txBody>
+          <a:bodyPr/>
+          <a:lstStyle/>
+          <a:p>
+            <a:r>
+              <a:rPr lang="en-US" altLang="zh-TW" dirty="0" smtClean="0"/>
+              <a:t>Add E-mail</a:t>
+            </a:r>
+            <a:endParaRPr lang="zh-TW" altLang="en-US" dirty="0"/>
+          </a:p>
+        </p:txBody>
+      </p:sp>
+      <p:sp>
+        <p:nvSpPr>
+          <p:cNvPr id="5" name="內容版面配置區 4"/>
+          <p:cNvSpPr>
+            <a:spLocks noGrp="1"/>
+          </p:cNvSpPr>
+          <p:nvPr>
+            <p:ph idx="1"/>
+          </p:nvPr>
+        </p:nvSpPr>
+        <p:spPr/>
+        <p:txBody>
+          <a:bodyPr/>
+          <a:lstStyle/>
+          <a:p>
+            <a:r>
+              <a:rPr lang="en-US" altLang="zh-TW" dirty="0" smtClean="0"/>
+              <a:t>To use g-mail, you have to configure secure options</a:t>
+            </a:r>
+            <a:endParaRPr lang="zh-TW" altLang="en-US" dirty="0"/>
+          </a:p>
+        </p:txBody>
+      </p:sp>
+      <p:pic>
+        <p:nvPicPr>
+          <p:cNvPr id="6" name="內容版面配置區 3" descr="Less secure apps - Account settings - Mozilla Firefox"/>
+          <p:cNvPicPr>
+            <a:picLocks noChangeAspect="1"/>
+          </p:cNvPicPr>
+          <p:nvPr/>
+        </p:nvPicPr>
+        <p:blipFill rotWithShape="1">
+          <a:blip r:embed="rId2">
+            <a:extLst>
+              <a:ext uri="{28A0092B-C50C-407E-A947-70E740481C1C}">
+                <a14:useLocalDpi xmlns:a14="http://schemas.microsoft.com/office/drawing/2010/main" val="0"/>
+              </a:ext>
+            </a:extLst>
+          </a:blip>
+          <a:srcRect t="15442" b="37511"/>
+          <a:stretch/>
+        </p:blipFill>
+        <p:spPr>
+          <a:xfrm>
+            <a:off x="838200" y="2429301"/>
+            <a:ext cx="11154160" cy="2825087"/>
+          </a:xfrm>
+          <a:prstGeom prst="rect">
+            <a:avLst/>
+          </a:prstGeom>
+        </p:spPr>
+      </p:pic>
+    </p:spTree>
+    <p:extLst>
+      <p:ext uri="{BB962C8B-B14F-4D97-AF65-F5344CB8AC3E}">
+        <p14:creationId xmlns:p14="http://schemas.microsoft.com/office/powerpoint/2010/main" val="2217483853"/>
+      </p:ext>
+    </p:extLst>
+  </p:cSld>
+  <p:clrMapOvr>
+    <a:masterClrMapping/>
+  </p:clrMapOvr>
+</p:sld>
+</file>
+
+<file path=ppt/slides/slide15.xml><?xml version="1.0" encoding="utf-8"?>
+<p:sld xmlns:a="http://schemas.openxmlformats.org/drawingml/2006/main" xmlns:r="http://schemas.openxmlformats.org/officeDocument/2006/relationships" xmlns:p="http://schemas.openxmlformats.org/presentationml/2006/main">
+  <p:cSld>
+    <p:spTree>
+      <p:nvGrpSpPr>
+        <p:cNvPr id="1" name=""/>
+        <p:cNvGrpSpPr/>
+        <p:nvPr/>
+      </p:nvGrpSpPr>
+      <p:grpSpPr>
+        <a:xfrm>
+          <a:off x="0" y="0"/>
+          <a:ext cx="0" cy="0"/>
+          <a:chOff x="0" y="0"/>
+          <a:chExt cx="0" cy="0"/>
+        </a:xfrm>
+      </p:grpSpPr>
+      <p:sp>
+        <p:nvSpPr>
+          <p:cNvPr id="2" name="標題 1"/>
+          <p:cNvSpPr>
+            <a:spLocks noGrp="1"/>
+          </p:cNvSpPr>
+          <p:nvPr>
+            <p:ph type="title"/>
+          </p:nvPr>
+        </p:nvSpPr>
+        <p:spPr/>
+        <p:txBody>
+          <a:bodyPr/>
+          <a:lstStyle/>
+          <a:p>
+            <a:r>
+              <a:rPr lang="en-US" altLang="zh-TW" dirty="0" smtClean="0"/>
+              <a:t>Add E-mail</a:t>
+            </a:r>
+            <a:endParaRPr lang="zh-TW" altLang="en-US" dirty="0"/>
+          </a:p>
+        </p:txBody>
+      </p:sp>
+      <p:pic>
+        <p:nvPicPr>
+          <p:cNvPr id="4" name="內容版面配置區 3" descr="張育維 - Outlook Web App - Mozilla Firefox"/>
+          <p:cNvPicPr>
+            <a:picLocks noGrp="1" noChangeAspect="1"/>
+          </p:cNvPicPr>
+          <p:nvPr>
+            <p:ph idx="1"/>
+          </p:nvPr>
+        </p:nvPicPr>
+        <p:blipFill rotWithShape="1">
+          <a:blip r:embed="rId2">
+            <a:extLst>
+              <a:ext uri="{28A0092B-C50C-407E-A947-70E740481C1C}">
+                <a14:useLocalDpi xmlns:a14="http://schemas.microsoft.com/office/drawing/2010/main" val="0"/>
+              </a:ext>
+            </a:extLst>
+          </a:blip>
+          <a:srcRect l="12017" t="23239" r="18754"/>
+          <a:stretch/>
+        </p:blipFill>
+        <p:spPr>
+          <a:xfrm>
+            <a:off x="838200" y="1690688"/>
+            <a:ext cx="5595583" cy="3340101"/>
+          </a:xfrm>
+        </p:spPr>
+      </p:pic>
+      <p:pic>
+        <p:nvPicPr>
+          <p:cNvPr id="6" name="圖片 5" descr="張育維 - Outlook Web App - Mozilla Firefox"/>
+          <p:cNvPicPr>
+            <a:picLocks noChangeAspect="1"/>
+          </p:cNvPicPr>
+          <p:nvPr/>
+        </p:nvPicPr>
+        <p:blipFill rotWithShape="1">
+          <a:blip r:embed="rId3">
+            <a:extLst>
+              <a:ext uri="{28A0092B-C50C-407E-A947-70E740481C1C}">
+                <a14:useLocalDpi xmlns:a14="http://schemas.microsoft.com/office/drawing/2010/main" val="0"/>
+              </a:ext>
+            </a:extLst>
+          </a:blip>
+          <a:srcRect l="12649" t="23124" r="28918" b="38199"/>
+          <a:stretch/>
+        </p:blipFill>
+        <p:spPr>
+          <a:xfrm>
+            <a:off x="4071583" y="3761499"/>
+            <a:ext cx="7124131" cy="2538579"/>
+          </a:xfrm>
+          <a:prstGeom prst="rect">
+            <a:avLst/>
+          </a:prstGeom>
+        </p:spPr>
+      </p:pic>
+    </p:spTree>
+    <p:extLst>
+      <p:ext uri="{BB962C8B-B14F-4D97-AF65-F5344CB8AC3E}">
+        <p14:creationId xmlns:p14="http://schemas.microsoft.com/office/powerpoint/2010/main" val="4207244894"/>
+      </p:ext>
+    </p:extLst>
+  </p:cSld>
+  <p:clrMapOvr>
+    <a:masterClrMapping/>
+  </p:clrMapOvr>
+</p:sld>
+</file>
+
 <file path=ppt/slides/slide2.xml><?xml version="1.0" encoding="utf-8"?>
 <p:sld xmlns:a="http://schemas.openxmlformats.org/drawingml/2006/main" xmlns:r="http://schemas.openxmlformats.org/officeDocument/2006/relationships" xmlns:p="http://schemas.openxmlformats.org/presentationml/2006/main">
   <p:cSld>
@@ -3807,7 +4292,6 @@
               <a:rPr lang="en-US" altLang="zh-TW" dirty="0" smtClean="0"/>
               <a:t>Flow</a:t>
             </a:r>
-            <a:endParaRPr lang="en-US" altLang="zh-TW" dirty="0" smtClean="0"/>
           </a:p>
           <a:p>
             <a:r>
@@ -3826,13 +4310,25 @@
               <a:rPr lang="en-US" altLang="zh-TW" dirty="0" smtClean="0"/>
               <a:t>Refactor</a:t>
             </a:r>
-            <a:endParaRPr lang="en-US" altLang="zh-TW" dirty="0" smtClean="0"/>
           </a:p>
           <a:p>
             <a:r>
               <a:rPr lang="en-US" altLang="zh-TW" dirty="0" smtClean="0"/>
               <a:t>Terminology</a:t>
             </a:r>
+          </a:p>
+          <a:p>
+            <a:r>
+              <a:rPr lang="en-US" altLang="zh-TW" dirty="0" smtClean="0"/>
+              <a:t>Question</a:t>
+            </a:r>
+          </a:p>
+          <a:p>
+            <a:r>
+              <a:rPr lang="en-US" altLang="zh-TW" dirty="0" smtClean="0"/>
+              <a:t>Add E-mail</a:t>
+            </a:r>
+            <a:endParaRPr lang="en-US" altLang="zh-TW" dirty="0" smtClean="0"/>
           </a:p>
           <a:p>
             <a:endParaRPr lang="zh-TW" altLang="en-US" dirty="0"/>
@@ -4371,32 +4867,621 @@
           <a:lstStyle/>
           <a:p>
             <a:r>
-              <a:rPr lang="en-US" altLang="zh-TW" smtClean="0"/>
+              <a:rPr lang="en-US" altLang="zh-TW" dirty="0" smtClean="0"/>
               <a:t>Flow</a:t>
             </a:r>
-            <a:endParaRPr lang="zh-TW" altLang="en-US"/>
-          </a:p>
-        </p:txBody>
-      </p:sp>
-      <p:sp>
-        <p:nvSpPr>
-          <p:cNvPr id="3" name="內容版面配置區 2"/>
-          <p:cNvSpPr>
-            <a:spLocks noGrp="1"/>
-          </p:cNvSpPr>
-          <p:nvPr>
-            <p:ph idx="1"/>
-          </p:nvPr>
-        </p:nvSpPr>
-        <p:spPr/>
-        <p:txBody>
-          <a:bodyPr/>
-          <a:lstStyle/>
-          <a:p>
-            <a:endParaRPr lang="zh-TW" altLang="en-US"/>
-          </a:p>
-        </p:txBody>
-      </p:sp>
+            <a:endParaRPr lang="zh-TW" altLang="en-US" dirty="0"/>
+          </a:p>
+        </p:txBody>
+      </p:sp>
+      <mc:AlternateContent xmlns:mc="http://schemas.openxmlformats.org/markup-compatibility/2006" xmlns:a14="http://schemas.microsoft.com/office/drawing/2010/main">
+        <mc:Choice Requires="a14">
+          <p:sp>
+            <p:nvSpPr>
+              <p:cNvPr id="3" name="內容版面配置區 2"/>
+              <p:cNvSpPr>
+                <a:spLocks noGrp="1"/>
+              </p:cNvSpPr>
+              <p:nvPr>
+                <p:ph idx="1"/>
+              </p:nvPr>
+            </p:nvSpPr>
+            <p:spPr/>
+            <p:txBody>
+              <a:bodyPr/>
+              <a:lstStyle/>
+              <a:p>
+                <a:r>
+                  <a:rPr lang="zh-TW" altLang="en-US" dirty="0" smtClean="0"/>
+                  <a:t>品</a:t>
+                </a:r>
+                <a:r>
+                  <a:rPr lang="en-US" altLang="zh-TW" dirty="0"/>
+                  <a:t>j</a:t>
+                </a:r>
+                <a:r>
+                  <a:rPr lang="zh-TW" altLang="en-US" dirty="0"/>
+                  <a:t>被客</a:t>
+                </a:r>
+                <a:r>
+                  <a:rPr lang="en-US" altLang="zh-TW" dirty="0" err="1"/>
+                  <a:t>i</a:t>
+                </a:r>
+                <a:r>
+                  <a:rPr lang="zh-TW" altLang="en-US" dirty="0" smtClean="0"/>
+                  <a:t>買</a:t>
+                </a:r>
+                <a14:m>
+                  <m:oMath xmlns:m="http://schemas.openxmlformats.org/officeDocument/2006/math">
+                    <m:r>
+                      <a:rPr lang="zh-TW" altLang="en-US" i="1" dirty="0">
+                        <a:latin typeface="Cambria Math" panose="02040503050406030204" pitchFamily="18" charset="0"/>
+                      </a:rPr>
+                      <m:t> </m:t>
+                    </m:r>
+                    <m:r>
+                      <a:rPr lang="en-US" altLang="zh-TW" i="1" dirty="0">
+                        <a:latin typeface="Cambria Math" panose="02040503050406030204" pitchFamily="18" charset="0"/>
+                      </a:rPr>
+                      <m:t>=</m:t>
+                    </m:r>
+                    <m:r>
+                      <a:rPr lang="zh-TW" altLang="en-US" i="1" dirty="0" smtClean="0">
+                        <a:latin typeface="Cambria Math" panose="02040503050406030204" pitchFamily="18" charset="0"/>
+                      </a:rPr>
+                      <m:t> </m:t>
+                    </m:r>
+                    <m:f>
+                      <m:fPr>
+                        <m:ctrlPr>
+                          <a:rPr lang="en-US" altLang="zh-TW" i="1" smtClean="0">
+                            <a:latin typeface="Cambria Math" panose="02040503050406030204" pitchFamily="18" charset="0"/>
+                          </a:rPr>
+                        </m:ctrlPr>
+                      </m:fPr>
+                      <m:num>
+                        <m:r>
+                          <a:rPr lang="zh-TW" altLang="en-US" i="1">
+                            <a:latin typeface="Cambria Math" panose="02040503050406030204" pitchFamily="18" charset="0"/>
+                          </a:rPr>
+                          <m:t>品</m:t>
+                        </m:r>
+                        <m:r>
+                          <m:rPr>
+                            <m:sty m:val="p"/>
+                          </m:rPr>
+                          <a:rPr lang="en-US" altLang="zh-TW" i="1">
+                            <a:latin typeface="Cambria Math" panose="02040503050406030204" pitchFamily="18" charset="0"/>
+                          </a:rPr>
+                          <m:t>j</m:t>
+                        </m:r>
+                        <m:r>
+                          <a:rPr lang="zh-TW" altLang="en-US" i="1">
+                            <a:latin typeface="Cambria Math" panose="02040503050406030204" pitchFamily="18" charset="0"/>
+                          </a:rPr>
+                          <m:t>在幾個</m:t>
+                        </m:r>
+                        <m:r>
+                          <m:rPr>
+                            <m:nor/>
+                          </m:rPr>
+                          <a:rPr lang="zh-TW" altLang="en-US" dirty="0"/>
+                          <m:t>客</m:t>
+                        </m:r>
+                        <m:r>
+                          <m:rPr>
+                            <m:nor/>
+                          </m:rPr>
+                          <a:rPr lang="en-US" altLang="zh-TW" dirty="0"/>
+                          <m:t>i</m:t>
+                        </m:r>
+                        <m:r>
+                          <a:rPr lang="zh-TW" altLang="en-US" i="1" dirty="0" smtClean="0">
+                            <a:latin typeface="Cambria Math" panose="02040503050406030204" pitchFamily="18" charset="0"/>
+                          </a:rPr>
+                          <m:t>的購物清單</m:t>
+                        </m:r>
+                      </m:num>
+                      <m:den>
+                        <m:r>
+                          <a:rPr lang="zh-TW" altLang="en-US" i="1">
+                            <a:latin typeface="Cambria Math" panose="02040503050406030204" pitchFamily="18" charset="0"/>
+                          </a:rPr>
+                          <m:t>品</m:t>
+                        </m:r>
+                        <m:r>
+                          <m:rPr>
+                            <m:sty m:val="p"/>
+                          </m:rPr>
+                          <a:rPr lang="en-US" altLang="zh-TW" i="1">
+                            <a:latin typeface="Cambria Math" panose="02040503050406030204" pitchFamily="18" charset="0"/>
+                          </a:rPr>
+                          <m:t>j</m:t>
+                        </m:r>
+                        <m:r>
+                          <a:rPr lang="zh-TW" altLang="en-US" i="1" smtClean="0">
+                            <a:latin typeface="Cambria Math" panose="02040503050406030204" pitchFamily="18" charset="0"/>
+                          </a:rPr>
+                          <m:t>在幾個</m:t>
+                        </m:r>
+                        <m:r>
+                          <a:rPr lang="zh-TW" altLang="en-US" i="1">
+                            <a:latin typeface="Cambria Math" panose="02040503050406030204" pitchFamily="18" charset="0"/>
+                          </a:rPr>
+                          <m:t>購物清單數量</m:t>
+                        </m:r>
+                      </m:den>
+                    </m:f>
+                  </m:oMath>
+                </a14:m>
+                <a:endParaRPr lang="en-US" altLang="zh-TW" dirty="0"/>
+              </a:p>
+              <a:p>
+                <a:r>
+                  <a:rPr lang="zh-TW" altLang="en-US" dirty="0"/>
+                  <a:t>客</a:t>
+                </a:r>
+                <a:r>
+                  <a:rPr lang="en-US" altLang="zh-TW" dirty="0" err="1"/>
+                  <a:t>i</a:t>
+                </a:r>
+                <a:r>
+                  <a:rPr lang="zh-TW" altLang="en-US" dirty="0"/>
+                  <a:t>買品</a:t>
+                </a:r>
+                <a:r>
+                  <a:rPr lang="en-US" altLang="zh-TW" dirty="0"/>
+                  <a:t>j</a:t>
+                </a:r>
+                <a:r>
+                  <a:rPr lang="zh-TW" altLang="en-US" dirty="0"/>
+                  <a:t>，推薦三</a:t>
+                </a:r>
+                <a:r>
+                  <a:rPr lang="zh-TW" altLang="en-US" dirty="0" smtClean="0"/>
+                  <a:t>件 </a:t>
+                </a:r>
+                <a14:m>
+                  <m:oMath xmlns:m="http://schemas.openxmlformats.org/officeDocument/2006/math">
+                    <m:r>
+                      <a:rPr lang="en-US" altLang="zh-TW" i="1" dirty="0">
+                        <a:latin typeface="Cambria Math" panose="02040503050406030204" pitchFamily="18" charset="0"/>
+                      </a:rPr>
+                      <m:t>=</m:t>
+                    </m:r>
+                    <m:r>
+                      <a:rPr lang="zh-TW" altLang="en-US" i="1" dirty="0">
+                        <a:latin typeface="Cambria Math" panose="02040503050406030204" pitchFamily="18" charset="0"/>
+                      </a:rPr>
+                      <m:t> </m:t>
+                    </m:r>
+                    <m:f>
+                      <m:fPr>
+                        <m:ctrlPr>
+                          <a:rPr lang="en-US" altLang="zh-TW" i="1">
+                            <a:latin typeface="Cambria Math" panose="02040503050406030204" pitchFamily="18" charset="0"/>
+                          </a:rPr>
+                        </m:ctrlPr>
+                      </m:fPr>
+                      <m:num>
+                        <m:r>
+                          <m:rPr>
+                            <m:nor/>
+                          </m:rPr>
+                          <a:rPr lang="zh-TW" altLang="en-US" dirty="0"/>
+                          <m:t>客</m:t>
+                        </m:r>
+                        <m:r>
+                          <m:rPr>
+                            <m:nor/>
+                          </m:rPr>
+                          <a:rPr lang="en-US" altLang="zh-TW" dirty="0"/>
+                          <m:t>i</m:t>
+                        </m:r>
+                        <m:r>
+                          <a:rPr lang="zh-TW" altLang="en-US" i="1" dirty="0" smtClean="0">
+                            <a:latin typeface="Cambria Math" panose="02040503050406030204" pitchFamily="18" charset="0"/>
+                          </a:rPr>
+                          <m:t>有</m:t>
+                        </m:r>
+                        <m:r>
+                          <m:rPr>
+                            <m:nor/>
+                          </m:rPr>
+                          <a:rPr lang="zh-TW" altLang="en-US" dirty="0"/>
+                          <m:t>買品</m:t>
+                        </m:r>
+                        <m:r>
+                          <m:rPr>
+                            <m:nor/>
+                          </m:rPr>
+                          <a:rPr lang="en-US" altLang="zh-TW" dirty="0"/>
+                          <m:t>j</m:t>
+                        </m:r>
+                        <m:r>
+                          <a:rPr lang="zh-TW" altLang="en-US" i="1">
+                            <a:latin typeface="Cambria Math" panose="02040503050406030204" pitchFamily="18" charset="0"/>
+                          </a:rPr>
+                          <m:t>購物清單數量</m:t>
+                        </m:r>
+                      </m:num>
+                      <m:den>
+                        <m:r>
+                          <m:rPr>
+                            <m:nor/>
+                          </m:rPr>
+                          <a:rPr lang="zh-TW" altLang="en-US" dirty="0"/>
+                          <m:t>客</m:t>
+                        </m:r>
+                        <m:r>
+                          <m:rPr>
+                            <m:nor/>
+                          </m:rPr>
+                          <a:rPr lang="en-US" altLang="zh-TW" dirty="0"/>
+                          <m:t>i</m:t>
+                        </m:r>
+                        <m:r>
+                          <a:rPr lang="zh-TW" altLang="en-US" i="1" dirty="0" smtClean="0">
+                            <a:latin typeface="Cambria Math" panose="02040503050406030204" pitchFamily="18" charset="0"/>
+                          </a:rPr>
+                          <m:t>買過</m:t>
+                        </m:r>
+                        <m:r>
+                          <a:rPr lang="zh-TW" altLang="en-US" i="1">
+                            <a:latin typeface="Cambria Math" panose="02040503050406030204" pitchFamily="18" charset="0"/>
+                          </a:rPr>
+                          <m:t>購物清單數量</m:t>
+                        </m:r>
+                      </m:den>
+                    </m:f>
+                  </m:oMath>
+                </a14:m>
+                <a:endParaRPr lang="en-US" altLang="zh-TW" dirty="0" smtClean="0"/>
+              </a:p>
+              <a:p>
+                <a:r>
+                  <a:rPr lang="en-US" altLang="zh-TW" dirty="0"/>
+                  <a:t>{</a:t>
+                </a:r>
+                <a:r>
+                  <a:rPr lang="zh-TW" altLang="en-US" dirty="0"/>
+                  <a:t>客</a:t>
+                </a:r>
+                <a:r>
+                  <a:rPr lang="en-US" altLang="zh-TW" dirty="0"/>
+                  <a:t>x,</a:t>
+                </a:r>
+                <a:r>
+                  <a:rPr lang="zh-TW" altLang="en-US" dirty="0"/>
+                  <a:t>品</a:t>
+                </a:r>
+                <a:r>
+                  <a:rPr lang="en-US" altLang="zh-TW" dirty="0"/>
+                  <a:t>y}</a:t>
+                </a:r>
+                <a:r>
+                  <a:rPr lang="zh-TW" altLang="en-US" dirty="0"/>
+                  <a:t>，品</a:t>
+                </a:r>
+                <a:r>
+                  <a:rPr lang="en-US" altLang="zh-TW" dirty="0"/>
+                  <a:t>z</a:t>
+                </a:r>
+                <a:r>
+                  <a:rPr lang="zh-TW" altLang="en-US" dirty="0"/>
+                  <a:t>被客</a:t>
+                </a:r>
+                <a:r>
+                  <a:rPr lang="en-US" altLang="zh-TW" dirty="0"/>
+                  <a:t>x</a:t>
+                </a:r>
+                <a:r>
+                  <a:rPr lang="zh-TW" altLang="en-US" dirty="0" smtClean="0"/>
+                  <a:t>買 </a:t>
+                </a:r>
+                <a14:m>
+                  <m:oMath xmlns:m="http://schemas.openxmlformats.org/officeDocument/2006/math">
+                    <m:r>
+                      <a:rPr lang="en-US" altLang="zh-TW" i="1" dirty="0">
+                        <a:latin typeface="Cambria Math" panose="02040503050406030204" pitchFamily="18" charset="0"/>
+                      </a:rPr>
+                      <m:t>=</m:t>
+                    </m:r>
+                    <m:r>
+                      <a:rPr lang="zh-TW" altLang="en-US" i="1" dirty="0">
+                        <a:latin typeface="Cambria Math" panose="02040503050406030204" pitchFamily="18" charset="0"/>
+                      </a:rPr>
+                      <m:t> </m:t>
+                    </m:r>
+                    <m:f>
+                      <m:fPr>
+                        <m:ctrlPr>
+                          <a:rPr lang="en-US" altLang="zh-TW" i="1">
+                            <a:latin typeface="Cambria Math" panose="02040503050406030204" pitchFamily="18" charset="0"/>
+                          </a:rPr>
+                        </m:ctrlPr>
+                      </m:fPr>
+                      <m:num>
+                        <m:r>
+                          <a:rPr lang="zh-TW" altLang="en-US" i="1">
+                            <a:latin typeface="Cambria Math" panose="02040503050406030204" pitchFamily="18" charset="0"/>
+                          </a:rPr>
+                          <m:t>品</m:t>
+                        </m:r>
+                        <m:r>
+                          <a:rPr lang="en-US" altLang="zh-TW" b="0" i="1" smtClean="0">
+                            <a:latin typeface="Cambria Math" panose="02040503050406030204" pitchFamily="18" charset="0"/>
+                          </a:rPr>
+                          <m:t>𝑧</m:t>
+                        </m:r>
+                        <m:r>
+                          <a:rPr lang="zh-TW" altLang="en-US" i="1">
+                            <a:latin typeface="Cambria Math" panose="02040503050406030204" pitchFamily="18" charset="0"/>
+                          </a:rPr>
+                          <m:t>在幾個</m:t>
+                        </m:r>
+                        <m:r>
+                          <m:rPr>
+                            <m:nor/>
+                          </m:rPr>
+                          <a:rPr lang="zh-TW" altLang="en-US" dirty="0"/>
+                          <m:t>客</m:t>
+                        </m:r>
+                        <m:r>
+                          <m:rPr>
+                            <m:nor/>
+                          </m:rPr>
+                          <a:rPr lang="en-US" altLang="zh-TW" b="0" i="0" dirty="0" smtClean="0"/>
+                          <m:t>x</m:t>
+                        </m:r>
+                        <m:r>
+                          <a:rPr lang="zh-TW" altLang="en-US" i="1" dirty="0">
+                            <a:latin typeface="Cambria Math" panose="02040503050406030204" pitchFamily="18" charset="0"/>
+                          </a:rPr>
+                          <m:t>有品</m:t>
+                        </m:r>
+                        <m:r>
+                          <m:rPr>
+                            <m:sty m:val="p"/>
+                          </m:rPr>
+                          <a:rPr lang="en-US" altLang="zh-TW" i="1" dirty="0">
+                            <a:latin typeface="Cambria Math" panose="02040503050406030204" pitchFamily="18" charset="0"/>
+                          </a:rPr>
+                          <m:t>y</m:t>
+                        </m:r>
+                        <m:r>
+                          <a:rPr lang="zh-TW" altLang="en-US" i="1" dirty="0">
+                            <a:latin typeface="Cambria Math" panose="02040503050406030204" pitchFamily="18" charset="0"/>
+                          </a:rPr>
+                          <m:t>的購物清單</m:t>
+                        </m:r>
+                      </m:num>
+                      <m:den>
+                        <m:r>
+                          <a:rPr lang="zh-TW" altLang="en-US" i="1">
+                            <a:latin typeface="Cambria Math" panose="02040503050406030204" pitchFamily="18" charset="0"/>
+                          </a:rPr>
+                          <m:t>品</m:t>
+                        </m:r>
+                        <m:r>
+                          <a:rPr lang="en-US" altLang="zh-TW" b="0" i="1" smtClean="0">
+                            <a:latin typeface="Cambria Math" panose="02040503050406030204" pitchFamily="18" charset="0"/>
+                          </a:rPr>
+                          <m:t>𝑧</m:t>
+                        </m:r>
+                        <m:r>
+                          <a:rPr lang="zh-TW" altLang="en-US" i="1">
+                            <a:latin typeface="Cambria Math" panose="02040503050406030204" pitchFamily="18" charset="0"/>
+                          </a:rPr>
+                          <m:t>在幾個購物清單數量</m:t>
+                        </m:r>
+                      </m:den>
+                    </m:f>
+                  </m:oMath>
+                </a14:m>
+                <a:endParaRPr lang="en-US" altLang="zh-TW" dirty="0"/>
+              </a:p>
+              <a:p>
+                <a:r>
+                  <a:rPr lang="en-US" altLang="zh-TW" dirty="0"/>
+                  <a:t>{</a:t>
+                </a:r>
+                <a:r>
+                  <a:rPr lang="zh-TW" altLang="en-US" dirty="0"/>
+                  <a:t>客</a:t>
+                </a:r>
+                <a:r>
+                  <a:rPr lang="en-US" altLang="zh-TW" dirty="0"/>
+                  <a:t>x,</a:t>
+                </a:r>
+                <a:r>
+                  <a:rPr lang="zh-TW" altLang="en-US" dirty="0"/>
+                  <a:t>品</a:t>
+                </a:r>
+                <a:r>
+                  <a:rPr lang="en-US" altLang="zh-TW" dirty="0"/>
+                  <a:t>y}</a:t>
+                </a:r>
+                <a:r>
+                  <a:rPr lang="zh-TW" altLang="en-US" dirty="0"/>
+                  <a:t>，客</a:t>
+                </a:r>
+                <a:r>
+                  <a:rPr lang="en-US" altLang="zh-TW" dirty="0"/>
+                  <a:t>x</a:t>
+                </a:r>
+                <a:r>
+                  <a:rPr lang="zh-TW" altLang="en-US" dirty="0"/>
+                  <a:t>買品</a:t>
+                </a:r>
+                <a:r>
+                  <a:rPr lang="en-US" altLang="zh-TW" dirty="0"/>
+                  <a:t>z</a:t>
+                </a:r>
+                <a:r>
+                  <a:rPr lang="zh-TW" altLang="en-US" dirty="0"/>
+                  <a:t>，推薦三</a:t>
+                </a:r>
+                <a:r>
+                  <a:rPr lang="zh-TW" altLang="en-US" dirty="0" smtClean="0"/>
+                  <a:t>件 </a:t>
+                </a:r>
+                <a14:m>
+                  <m:oMath xmlns:m="http://schemas.openxmlformats.org/officeDocument/2006/math">
+                    <m:r>
+                      <a:rPr lang="en-US" altLang="zh-TW" i="1" dirty="0">
+                        <a:latin typeface="Cambria Math" panose="02040503050406030204" pitchFamily="18" charset="0"/>
+                      </a:rPr>
+                      <m:t>=</m:t>
+                    </m:r>
+                    <m:r>
+                      <a:rPr lang="zh-TW" altLang="en-US" i="1" dirty="0">
+                        <a:latin typeface="Cambria Math" panose="02040503050406030204" pitchFamily="18" charset="0"/>
+                      </a:rPr>
+                      <m:t> </m:t>
+                    </m:r>
+                    <m:f>
+                      <m:fPr>
+                        <m:ctrlPr>
+                          <a:rPr lang="en-US" altLang="zh-TW" i="1">
+                            <a:latin typeface="Cambria Math" panose="02040503050406030204" pitchFamily="18" charset="0"/>
+                          </a:rPr>
+                        </m:ctrlPr>
+                      </m:fPr>
+                      <m:num>
+                        <m:r>
+                          <m:rPr>
+                            <m:nor/>
+                          </m:rPr>
+                          <a:rPr lang="zh-TW" altLang="en-US" dirty="0"/>
+                          <m:t>客</m:t>
+                        </m:r>
+                        <m:r>
+                          <m:rPr>
+                            <m:nor/>
+                          </m:rPr>
+                          <a:rPr lang="en-US" altLang="zh-TW" dirty="0"/>
+                          <m:t>x</m:t>
+                        </m:r>
+                        <m:r>
+                          <m:rPr>
+                            <m:nor/>
+                          </m:rPr>
+                          <a:rPr lang="zh-TW" altLang="en-US" dirty="0"/>
+                          <m:t>買品</m:t>
+                        </m:r>
+                        <m:r>
+                          <m:rPr>
+                            <m:nor/>
+                          </m:rPr>
+                          <a:rPr lang="en-US" altLang="zh-TW" dirty="0"/>
+                          <m:t>y</m:t>
+                        </m:r>
+                        <m:r>
+                          <a:rPr lang="zh-TW" altLang="en-US" i="1" dirty="0" smtClean="0">
+                            <a:latin typeface="Cambria Math" panose="02040503050406030204" pitchFamily="18" charset="0"/>
+                          </a:rPr>
+                          <m:t>和</m:t>
+                        </m:r>
+                        <m:r>
+                          <m:rPr>
+                            <m:nor/>
+                          </m:rPr>
+                          <a:rPr lang="zh-TW" altLang="en-US" dirty="0"/>
+                          <m:t>品</m:t>
+                        </m:r>
+                        <m:r>
+                          <m:rPr>
+                            <m:nor/>
+                          </m:rPr>
+                          <a:rPr lang="en-US" altLang="zh-TW" dirty="0"/>
+                          <m:t>z</m:t>
+                        </m:r>
+                        <m:r>
+                          <a:rPr lang="zh-TW" altLang="en-US" i="1" dirty="0">
+                            <a:latin typeface="Cambria Math" panose="02040503050406030204" pitchFamily="18" charset="0"/>
+                          </a:rPr>
+                          <m:t>購物清單</m:t>
+                        </m:r>
+                      </m:num>
+                      <m:den>
+                        <m:r>
+                          <m:rPr>
+                            <m:nor/>
+                          </m:rPr>
+                          <a:rPr lang="zh-TW" altLang="en-US" dirty="0"/>
+                          <m:t>客</m:t>
+                        </m:r>
+                        <m:r>
+                          <m:rPr>
+                            <m:nor/>
+                          </m:rPr>
+                          <a:rPr lang="en-US" altLang="zh-TW" dirty="0"/>
+                          <m:t>x</m:t>
+                        </m:r>
+                        <m:r>
+                          <m:rPr>
+                            <m:nor/>
+                          </m:rPr>
+                          <a:rPr lang="zh-TW" altLang="en-US" dirty="0"/>
+                          <m:t>買品</m:t>
+                        </m:r>
+                        <m:r>
+                          <m:rPr>
+                            <m:nor/>
+                          </m:rPr>
+                          <a:rPr lang="en-US" altLang="zh-TW" b="0" i="0" dirty="0" smtClean="0"/>
+                          <m:t>y</m:t>
+                        </m:r>
+                        <m:r>
+                          <a:rPr lang="zh-TW" altLang="en-US" i="1">
+                            <a:latin typeface="Cambria Math" panose="02040503050406030204" pitchFamily="18" charset="0"/>
+                          </a:rPr>
+                          <m:t>購物清單數量</m:t>
+                        </m:r>
+                      </m:den>
+                    </m:f>
+                  </m:oMath>
+                </a14:m>
+                <a:endParaRPr lang="zh-TW" altLang="en-US" dirty="0"/>
+              </a:p>
+            </p:txBody>
+          </p:sp>
+        </mc:Choice>
+        <mc:Fallback xmlns="">
+          <p:sp>
+            <p:nvSpPr>
+              <p:cNvPr id="3" name="內容版面配置區 2"/>
+              <p:cNvSpPr>
+                <a:spLocks noGrp="1" noRot="1" noChangeAspect="1" noMove="1" noResize="1" noEditPoints="1" noAdjustHandles="1" noChangeArrowheads="1" noChangeShapeType="1" noTextEdit="1"/>
+              </p:cNvSpPr>
+              <p:nvPr>
+                <p:ph idx="1"/>
+              </p:nvPr>
+            </p:nvSpPr>
+            <p:spPr>
+              <a:blipFill rotWithShape="0">
+                <a:blip r:embed="rId2"/>
+                <a:stretch>
+                  <a:fillRect l="-1043"/>
+                </a:stretch>
+              </a:blipFill>
+            </p:spPr>
+            <p:txBody>
+              <a:bodyPr/>
+              <a:lstStyle/>
+              <a:p>
+                <a:r>
+                  <a:rPr lang="zh-TW" altLang="en-US">
+                    <a:noFill/>
+                  </a:rPr>
+                  <a:t> </a:t>
+                </a:r>
+              </a:p>
+            </p:txBody>
+          </p:sp>
+        </mc:Fallback>
+      </mc:AlternateContent>
     </p:spTree>
     <p:extLst>
       <p:ext uri="{BB962C8B-B14F-4D97-AF65-F5344CB8AC3E}">

</xml_diff>

<commit_message>
2015/6/7 Publishing to facebook suggestion
</commit_message>
<xml_diff>
--- a/DM_PJ03_Probability.pptx
+++ b/DM_PJ03_Probability.pptx
@@ -5,7 +5,7 @@
     <p:sldMasterId id="2147483648" r:id="rId1"/>
   </p:sldMasterIdLst>
   <p:notesMasterIdLst>
-    <p:notesMasterId r:id="rId17"/>
+    <p:notesMasterId r:id="rId19"/>
   </p:notesMasterIdLst>
   <p:sldIdLst>
     <p:sldId id="256" r:id="rId2"/>
@@ -23,6 +23,8 @@
     <p:sldId id="268" r:id="rId14"/>
     <p:sldId id="269" r:id="rId15"/>
     <p:sldId id="270" r:id="rId16"/>
+    <p:sldId id="271" r:id="rId17"/>
+    <p:sldId id="272" r:id="rId18"/>
   </p:sldIdLst>
   <p:sldSz cx="12192000" cy="6858000"/>
   <p:notesSz cx="6858000" cy="9144000"/>
@@ -141,6 +143,8 @@
             <p14:sldId id="268"/>
             <p14:sldId id="269"/>
             <p14:sldId id="270"/>
+            <p14:sldId id="271"/>
+            <p14:sldId id="272"/>
           </p14:sldIdLst>
         </p14:section>
       </p14:sectionLst>
@@ -234,7 +238,7 @@
           <a:p>
             <a:fld id="{3B5DFD4B-5A95-449E-A695-0FEB48B770F1}" type="datetimeFigureOut">
               <a:rPr lang="zh-TW" altLang="en-US" smtClean="0"/>
-              <a:t>2015/5/28</a:t>
+              <a:t>2015/6/7</a:t>
             </a:fld>
             <a:endParaRPr lang="zh-TW" altLang="en-US"/>
           </a:p>
@@ -737,7 +741,7 @@
           <a:p>
             <a:fld id="{7C83E2A3-B24E-4406-8D12-05C9EB45BDB5}" type="datetimeFigureOut">
               <a:rPr lang="zh-TW" altLang="en-US" smtClean="0"/>
-              <a:t>2015/5/28</a:t>
+              <a:t>2015/6/7</a:t>
             </a:fld>
             <a:endParaRPr lang="zh-TW" altLang="en-US"/>
           </a:p>
@@ -907,7 +911,7 @@
           <a:p>
             <a:fld id="{7C83E2A3-B24E-4406-8D12-05C9EB45BDB5}" type="datetimeFigureOut">
               <a:rPr lang="zh-TW" altLang="en-US" smtClean="0"/>
-              <a:t>2015/5/28</a:t>
+              <a:t>2015/6/7</a:t>
             </a:fld>
             <a:endParaRPr lang="zh-TW" altLang="en-US"/>
           </a:p>
@@ -1087,7 +1091,7 @@
           <a:p>
             <a:fld id="{7C83E2A3-B24E-4406-8D12-05C9EB45BDB5}" type="datetimeFigureOut">
               <a:rPr lang="zh-TW" altLang="en-US" smtClean="0"/>
-              <a:t>2015/5/28</a:t>
+              <a:t>2015/6/7</a:t>
             </a:fld>
             <a:endParaRPr lang="zh-TW" altLang="en-US"/>
           </a:p>
@@ -1257,7 +1261,7 @@
           <a:p>
             <a:fld id="{7C83E2A3-B24E-4406-8D12-05C9EB45BDB5}" type="datetimeFigureOut">
               <a:rPr lang="zh-TW" altLang="en-US" smtClean="0"/>
-              <a:t>2015/5/28</a:t>
+              <a:t>2015/6/7</a:t>
             </a:fld>
             <a:endParaRPr lang="zh-TW" altLang="en-US"/>
           </a:p>
@@ -1503,7 +1507,7 @@
           <a:p>
             <a:fld id="{7C83E2A3-B24E-4406-8D12-05C9EB45BDB5}" type="datetimeFigureOut">
               <a:rPr lang="zh-TW" altLang="en-US" smtClean="0"/>
-              <a:t>2015/5/28</a:t>
+              <a:t>2015/6/7</a:t>
             </a:fld>
             <a:endParaRPr lang="zh-TW" altLang="en-US"/>
           </a:p>
@@ -1735,7 +1739,7 @@
           <a:p>
             <a:fld id="{7C83E2A3-B24E-4406-8D12-05C9EB45BDB5}" type="datetimeFigureOut">
               <a:rPr lang="zh-TW" altLang="en-US" smtClean="0"/>
-              <a:t>2015/5/28</a:t>
+              <a:t>2015/6/7</a:t>
             </a:fld>
             <a:endParaRPr lang="zh-TW" altLang="en-US"/>
           </a:p>
@@ -2102,7 +2106,7 @@
           <a:p>
             <a:fld id="{7C83E2A3-B24E-4406-8D12-05C9EB45BDB5}" type="datetimeFigureOut">
               <a:rPr lang="zh-TW" altLang="en-US" smtClean="0"/>
-              <a:t>2015/5/28</a:t>
+              <a:t>2015/6/7</a:t>
             </a:fld>
             <a:endParaRPr lang="zh-TW" altLang="en-US"/>
           </a:p>
@@ -2220,7 +2224,7 @@
           <a:p>
             <a:fld id="{7C83E2A3-B24E-4406-8D12-05C9EB45BDB5}" type="datetimeFigureOut">
               <a:rPr lang="zh-TW" altLang="en-US" smtClean="0"/>
-              <a:t>2015/5/28</a:t>
+              <a:t>2015/6/7</a:t>
             </a:fld>
             <a:endParaRPr lang="zh-TW" altLang="en-US"/>
           </a:p>
@@ -2315,7 +2319,7 @@
           <a:p>
             <a:fld id="{7C83E2A3-B24E-4406-8D12-05C9EB45BDB5}" type="datetimeFigureOut">
               <a:rPr lang="zh-TW" altLang="en-US" smtClean="0"/>
-              <a:t>2015/5/28</a:t>
+              <a:t>2015/6/7</a:t>
             </a:fld>
             <a:endParaRPr lang="zh-TW" altLang="en-US"/>
           </a:p>
@@ -2592,7 +2596,7 @@
           <a:p>
             <a:fld id="{7C83E2A3-B24E-4406-8D12-05C9EB45BDB5}" type="datetimeFigureOut">
               <a:rPr lang="zh-TW" altLang="en-US" smtClean="0"/>
-              <a:t>2015/5/28</a:t>
+              <a:t>2015/6/7</a:t>
             </a:fld>
             <a:endParaRPr lang="zh-TW" altLang="en-US"/>
           </a:p>
@@ -2845,7 +2849,7 @@
           <a:p>
             <a:fld id="{7C83E2A3-B24E-4406-8D12-05C9EB45BDB5}" type="datetimeFigureOut">
               <a:rPr lang="zh-TW" altLang="en-US" smtClean="0"/>
-              <a:t>2015/5/28</a:t>
+              <a:t>2015/6/7</a:t>
             </a:fld>
             <a:endParaRPr lang="zh-TW" altLang="en-US"/>
           </a:p>
@@ -3058,7 +3062,7 @@
           <a:p>
             <a:fld id="{7C83E2A3-B24E-4406-8D12-05C9EB45BDB5}" type="datetimeFigureOut">
               <a:rPr lang="zh-TW" altLang="en-US" smtClean="0"/>
-              <a:t>2015/5/28</a:t>
+              <a:t>2015/6/7</a:t>
             </a:fld>
             <a:endParaRPr lang="zh-TW" altLang="en-US"/>
           </a:p>
@@ -3721,11 +3725,7 @@
           <a:p>
             <a:r>
               <a:rPr lang="en-US" altLang="zh-TW" dirty="0" smtClean="0"/>
-              <a:t>JAF (</a:t>
-            </a:r>
-            <a:r>
-              <a:rPr lang="en-US" altLang="zh-TW" dirty="0" smtClean="0"/>
-              <a:t>JavaBeans </a:t>
+              <a:t>JAF (JavaBeans </a:t>
             </a:r>
             <a:r>
               <a:rPr lang="en-US" altLang="zh-TW" dirty="0"/>
@@ -3735,46 +3735,22 @@
               <a:rPr lang="en-US" altLang="zh-TW" dirty="0" smtClean="0"/>
               <a:t>Framework)</a:t>
             </a:r>
-            <a:endParaRPr lang="en-US" altLang="zh-TW" dirty="0" smtClean="0"/>
           </a:p>
           <a:p>
             <a:r>
               <a:rPr lang="en-US" altLang="zh-TW" dirty="0" smtClean="0"/>
               <a:t>Guava</a:t>
             </a:r>
+          </a:p>
+          <a:p>
+            <a:r>
+              <a:rPr lang="en-US" altLang="zh-TW" dirty="0" err="1" smtClean="0"/>
+              <a:t>restfb</a:t>
+            </a:r>
             <a:endParaRPr lang="zh-TW" altLang="en-US" dirty="0"/>
           </a:p>
         </p:txBody>
       </p:sp>
-      <p:pic>
-        <p:nvPicPr>
-          <p:cNvPr id="4" name="內容版面配置區 5" descr="google/guava - Mozilla Firefox"/>
-          <p:cNvPicPr>
-            <a:picLocks noChangeAspect="1"/>
-          </p:cNvPicPr>
-          <p:nvPr/>
-        </p:nvPicPr>
-        <p:blipFill rotWithShape="1">
-          <a:blip r:embed="rId4">
-            <a:extLst>
-              <a:ext uri="{28A0092B-C50C-407E-A947-70E740481C1C}">
-                <a14:useLocalDpi xmlns:a14="http://schemas.microsoft.com/office/drawing/2010/main" val="0"/>
-              </a:ext>
-            </a:extLst>
-          </a:blip>
-          <a:srcRect l="13269" t="14466" r="31179"/>
-          <a:stretch/>
-        </p:blipFill>
-        <p:spPr>
-          <a:xfrm>
-            <a:off x="1029268" y="4001294"/>
-            <a:ext cx="6233853" cy="5167312"/>
-          </a:xfrm>
-          <a:prstGeom prst="rect">
-            <a:avLst/>
-          </a:prstGeom>
-        </p:spPr>
-      </p:pic>
     </p:spTree>
     <p:extLst>
       <p:ext uri="{BB962C8B-B14F-4D97-AF65-F5344CB8AC3E}">
@@ -4227,6 +4203,176 @@
 </p:sld>
 </file>
 
+<file path=ppt/slides/slide16.xml><?xml version="1.0" encoding="utf-8"?>
+<p:sld xmlns:a="http://schemas.openxmlformats.org/drawingml/2006/main" xmlns:r="http://schemas.openxmlformats.org/officeDocument/2006/relationships" xmlns:p="http://schemas.openxmlformats.org/presentationml/2006/main">
+  <p:cSld>
+    <p:spTree>
+      <p:nvGrpSpPr>
+        <p:cNvPr id="1" name=""/>
+        <p:cNvGrpSpPr/>
+        <p:nvPr/>
+      </p:nvGrpSpPr>
+      <p:grpSpPr>
+        <a:xfrm>
+          <a:off x="0" y="0"/>
+          <a:ext cx="0" cy="0"/>
+          <a:chOff x="0" y="0"/>
+          <a:chExt cx="0" cy="0"/>
+        </a:xfrm>
+      </p:grpSpPr>
+      <p:sp>
+        <p:nvSpPr>
+          <p:cNvPr id="2" name="標題 1"/>
+          <p:cNvSpPr>
+            <a:spLocks noGrp="1"/>
+          </p:cNvSpPr>
+          <p:nvPr>
+            <p:ph type="title"/>
+          </p:nvPr>
+        </p:nvSpPr>
+        <p:spPr/>
+        <p:txBody>
+          <a:bodyPr/>
+          <a:lstStyle/>
+          <a:p>
+            <a:r>
+              <a:rPr lang="en-US" altLang="zh-TW" dirty="0"/>
+              <a:t>Online suggestion on </a:t>
+            </a:r>
+            <a:r>
+              <a:rPr lang="en-US" altLang="zh-TW" dirty="0" err="1"/>
+              <a:t>facebook</a:t>
+            </a:r>
+            <a:endParaRPr lang="zh-TW" altLang="en-US" dirty="0"/>
+          </a:p>
+        </p:txBody>
+      </p:sp>
+      <p:pic>
+        <p:nvPicPr>
+          <p:cNvPr id="4" name="內容版面配置區 3" descr="Java - ShoppingCart/src/controller/console/ConsoleCall.java - Eclipse"/>
+          <p:cNvPicPr>
+            <a:picLocks noGrp="1" noChangeAspect="1"/>
+          </p:cNvPicPr>
+          <p:nvPr>
+            <p:ph idx="1"/>
+          </p:nvPr>
+        </p:nvPicPr>
+        <p:blipFill rotWithShape="1">
+          <a:blip r:embed="rId2">
+            <a:extLst>
+              <a:ext uri="{28A0092B-C50C-407E-A947-70E740481C1C}">
+                <a14:useLocalDpi xmlns:a14="http://schemas.microsoft.com/office/drawing/2010/main" val="0"/>
+              </a:ext>
+            </a:extLst>
+          </a:blip>
+          <a:srcRect l="21036" t="55902" r="20373" b="7715"/>
+          <a:stretch/>
+        </p:blipFill>
+        <p:spPr>
+          <a:xfrm>
+            <a:off x="418795" y="1690688"/>
+            <a:ext cx="11354409" cy="3795712"/>
+          </a:xfrm>
+        </p:spPr>
+      </p:pic>
+    </p:spTree>
+    <p:extLst>
+      <p:ext uri="{BB962C8B-B14F-4D97-AF65-F5344CB8AC3E}">
+        <p14:creationId xmlns:p14="http://schemas.microsoft.com/office/powerpoint/2010/main" val="71148084"/>
+      </p:ext>
+    </p:extLst>
+  </p:cSld>
+  <p:clrMapOvr>
+    <a:masterClrMapping/>
+  </p:clrMapOvr>
+</p:sld>
+</file>
+
+<file path=ppt/slides/slide17.xml><?xml version="1.0" encoding="utf-8"?>
+<p:sld xmlns:a="http://schemas.openxmlformats.org/drawingml/2006/main" xmlns:r="http://schemas.openxmlformats.org/officeDocument/2006/relationships" xmlns:p="http://schemas.openxmlformats.org/presentationml/2006/main">
+  <p:cSld>
+    <p:spTree>
+      <p:nvGrpSpPr>
+        <p:cNvPr id="1" name=""/>
+        <p:cNvGrpSpPr/>
+        <p:nvPr/>
+      </p:nvGrpSpPr>
+      <p:grpSpPr>
+        <a:xfrm>
+          <a:off x="0" y="0"/>
+          <a:ext cx="0" cy="0"/>
+          <a:chOff x="0" y="0"/>
+          <a:chExt cx="0" cy="0"/>
+        </a:xfrm>
+      </p:grpSpPr>
+      <p:sp>
+        <p:nvSpPr>
+          <p:cNvPr id="2" name="標題 1"/>
+          <p:cNvSpPr>
+            <a:spLocks noGrp="1"/>
+          </p:cNvSpPr>
+          <p:nvPr>
+            <p:ph type="title"/>
+          </p:nvPr>
+        </p:nvSpPr>
+        <p:spPr/>
+        <p:txBody>
+          <a:bodyPr/>
+          <a:lstStyle/>
+          <a:p>
+            <a:r>
+              <a:rPr lang="en-US" altLang="zh-TW" dirty="0"/>
+              <a:t>Online suggestion on </a:t>
+            </a:r>
+            <a:r>
+              <a:rPr lang="en-US" altLang="zh-TW" dirty="0" err="1"/>
+              <a:t>facebook</a:t>
+            </a:r>
+            <a:endParaRPr lang="zh-TW" altLang="en-US" dirty="0"/>
+          </a:p>
+        </p:txBody>
+      </p:sp>
+      <p:pic>
+        <p:nvPicPr>
+          <p:cNvPr id="4" name="內容版面配置區 3" descr="Game2048extend - Mozilla Firefox"/>
+          <p:cNvPicPr>
+            <a:picLocks noGrp="1" noChangeAspect="1"/>
+          </p:cNvPicPr>
+          <p:nvPr>
+            <p:ph idx="1"/>
+          </p:nvPr>
+        </p:nvPicPr>
+        <p:blipFill rotWithShape="1">
+          <a:blip r:embed="rId2">
+            <a:extLst>
+              <a:ext uri="{28A0092B-C50C-407E-A947-70E740481C1C}">
+                <a14:useLocalDpi xmlns:a14="http://schemas.microsoft.com/office/drawing/2010/main" val="0"/>
+              </a:ext>
+            </a:extLst>
+          </a:blip>
+          <a:srcRect l="6008" t="25444" r="31348" b="19042"/>
+          <a:stretch/>
+        </p:blipFill>
+        <p:spPr>
+          <a:xfrm>
+            <a:off x="1410837" y="1690688"/>
+            <a:ext cx="9370325" cy="4470480"/>
+          </a:xfrm>
+        </p:spPr>
+      </p:pic>
+    </p:spTree>
+    <p:extLst>
+      <p:ext uri="{BB962C8B-B14F-4D97-AF65-F5344CB8AC3E}">
+        <p14:creationId xmlns:p14="http://schemas.microsoft.com/office/powerpoint/2010/main" val="260999828"/>
+      </p:ext>
+    </p:extLst>
+  </p:cSld>
+  <p:clrMapOvr>
+    <a:masterClrMapping/>
+  </p:clrMapOvr>
+</p:sld>
+</file>
+
 <file path=ppt/slides/slide2.xml><?xml version="1.0" encoding="utf-8"?>
 <p:sld xmlns:a="http://schemas.openxmlformats.org/drawingml/2006/main" xmlns:r="http://schemas.openxmlformats.org/officeDocument/2006/relationships" xmlns:p="http://schemas.openxmlformats.org/presentationml/2006/main">
   <p:cSld>
@@ -4279,7 +4425,9 @@
         </p:nvSpPr>
         <p:spPr/>
         <p:txBody>
-          <a:bodyPr/>
+          <a:bodyPr>
+            <a:normAutofit lnSpcReduction="10000"/>
+          </a:bodyPr>
           <a:lstStyle/>
           <a:p>
             <a:r>
@@ -4326,7 +4474,21 @@
           <a:p>
             <a:r>
               <a:rPr lang="en-US" altLang="zh-TW" dirty="0" smtClean="0"/>
-              <a:t>Add E-mail</a:t>
+              <a:t>Add </a:t>
+            </a:r>
+            <a:r>
+              <a:rPr lang="en-US" altLang="zh-TW" dirty="0" smtClean="0"/>
+              <a:t>E-mail</a:t>
+            </a:r>
+          </a:p>
+          <a:p>
+            <a:r>
+              <a:rPr lang="en-US" altLang="zh-TW" dirty="0" smtClean="0"/>
+              <a:t>Online suggestion on </a:t>
+            </a:r>
+            <a:r>
+              <a:rPr lang="en-US" altLang="zh-TW" dirty="0" err="1" smtClean="0"/>
+              <a:t>facebook</a:t>
             </a:r>
             <a:endParaRPr lang="en-US" altLang="zh-TW" dirty="0" smtClean="0"/>
           </a:p>

</xml_diff>

<commit_message>
2015/6/7 Multithread with probability but the rule generation is still slow
</commit_message>
<xml_diff>
--- a/DM_PJ03_Probability.pptx
+++ b/DM_PJ03_Probability.pptx
@@ -5,7 +5,7 @@
     <p:sldMasterId id="2147483648" r:id="rId1"/>
   </p:sldMasterIdLst>
   <p:notesMasterIdLst>
-    <p:notesMasterId r:id="rId19"/>
+    <p:notesMasterId r:id="rId20"/>
   </p:notesMasterIdLst>
   <p:sldIdLst>
     <p:sldId id="256" r:id="rId2"/>
@@ -24,7 +24,8 @@
     <p:sldId id="269" r:id="rId15"/>
     <p:sldId id="270" r:id="rId16"/>
     <p:sldId id="271" r:id="rId17"/>
-    <p:sldId id="272" r:id="rId18"/>
+    <p:sldId id="273" r:id="rId18"/>
+    <p:sldId id="272" r:id="rId19"/>
   </p:sldIdLst>
   <p:sldSz cx="12192000" cy="6858000"/>
   <p:notesSz cx="6858000" cy="9144000"/>
@@ -144,6 +145,7 @@
             <p14:sldId id="269"/>
             <p14:sldId id="270"/>
             <p14:sldId id="271"/>
+            <p14:sldId id="273"/>
             <p14:sldId id="272"/>
           </p14:sldIdLst>
         </p14:section>
@@ -4237,7 +4239,11 @@
           <a:p>
             <a:r>
               <a:rPr lang="en-US" altLang="zh-TW" dirty="0"/>
-              <a:t>Online suggestion on </a:t>
+              <a:t>In time </a:t>
+            </a:r>
+            <a:r>
+              <a:rPr lang="en-US" altLang="zh-TW" dirty="0"/>
+              <a:t>suggestion on </a:t>
             </a:r>
             <a:r>
               <a:rPr lang="en-US" altLang="zh-TW" dirty="0" err="1"/>
@@ -4322,7 +4328,257 @@
           <a:p>
             <a:r>
               <a:rPr lang="en-US" altLang="zh-TW" dirty="0"/>
-              <a:t>Online suggestion on </a:t>
+              <a:t>In time suggestion on </a:t>
+            </a:r>
+            <a:r>
+              <a:rPr lang="en-US" altLang="zh-TW" dirty="0" err="1"/>
+              <a:t>facebook</a:t>
+            </a:r>
+            <a:endParaRPr lang="zh-TW" altLang="en-US" dirty="0"/>
+          </a:p>
+        </p:txBody>
+      </p:sp>
+      <p:sp>
+        <p:nvSpPr>
+          <p:cNvPr id="3" name="內容版面配置區 2"/>
+          <p:cNvSpPr>
+            <a:spLocks noGrp="1"/>
+          </p:cNvSpPr>
+          <p:nvPr>
+            <p:ph idx="1"/>
+          </p:nvPr>
+        </p:nvSpPr>
+        <p:spPr/>
+        <p:txBody>
+          <a:bodyPr>
+            <a:normAutofit fontScale="77500" lnSpcReduction="20000"/>
+          </a:bodyPr>
+          <a:lstStyle/>
+          <a:p>
+            <a:r>
+              <a:rPr lang="en-US" altLang="zh-TW" dirty="0" smtClean="0"/>
+              <a:t>Using multithread</a:t>
+            </a:r>
+          </a:p>
+          <a:p>
+            <a:r>
+              <a:rPr lang="en-US" altLang="zh-TW" dirty="0"/>
+              <a:t>/**</a:t>
+            </a:r>
+          </a:p>
+          <a:p>
+            <a:r>
+              <a:rPr lang="en-US" altLang="zh-TW" dirty="0"/>
+              <a:t> * Using </a:t>
+            </a:r>
+            <a:r>
+              <a:rPr lang="en-US" altLang="zh-TW" u="sng" dirty="0"/>
+              <a:t>multithread to cope with big data </a:t>
+            </a:r>
+          </a:p>
+          <a:p>
+            <a:r>
+              <a:rPr lang="zh-TW" altLang="en-US" dirty="0"/>
+              <a:t> *</a:t>
+            </a:r>
+            <a:r>
+              <a:rPr lang="en-US" altLang="zh-TW" dirty="0"/>
+              <a:t>/</a:t>
+            </a:r>
+          </a:p>
+          <a:p>
+            <a:r>
+              <a:rPr lang="en-US" altLang="zh-TW" b="1" dirty="0" err="1"/>
+              <a:t>LoadProbability</a:t>
+            </a:r>
+            <a:r>
+              <a:rPr lang="en-US" altLang="zh-TW" b="1" dirty="0"/>
+              <a:t> </a:t>
+            </a:r>
+            <a:r>
+              <a:rPr lang="en-US" altLang="zh-TW" b="1" dirty="0" err="1"/>
+              <a:t>loadProbability</a:t>
+            </a:r>
+            <a:r>
+              <a:rPr lang="en-US" altLang="zh-TW" b="1" dirty="0"/>
+              <a:t> = new </a:t>
+            </a:r>
+            <a:r>
+              <a:rPr lang="en-US" altLang="zh-TW" b="1" dirty="0" err="1"/>
+              <a:t>LoadProbability</a:t>
+            </a:r>
+            <a:r>
+              <a:rPr lang="en-US" altLang="zh-TW" b="1" dirty="0"/>
+              <a:t>();</a:t>
+            </a:r>
+          </a:p>
+          <a:p>
+            <a:r>
+              <a:rPr lang="en-US" altLang="zh-TW" dirty="0" err="1"/>
+              <a:t>loadProbability.start</a:t>
+            </a:r>
+            <a:r>
+              <a:rPr lang="en-US" altLang="zh-TW" dirty="0"/>
+              <a:t>();</a:t>
+            </a:r>
+          </a:p>
+          <a:p>
+            <a:endParaRPr lang="zh-TW" altLang="en-US" dirty="0"/>
+          </a:p>
+          <a:p>
+            <a:r>
+              <a:rPr lang="en-US" altLang="zh-TW" dirty="0"/>
+              <a:t>// new </a:t>
+            </a:r>
+            <a:r>
+              <a:rPr lang="en-US" altLang="zh-TW" dirty="0" err="1"/>
+              <a:t>RuleGUI</a:t>
+            </a:r>
+            <a:r>
+              <a:rPr lang="en-US" altLang="zh-TW" dirty="0"/>
+              <a:t>(</a:t>
+            </a:r>
+            <a:r>
+              <a:rPr lang="en-US" altLang="zh-TW" dirty="0" err="1"/>
+              <a:t>ShoppingCartUtils.addShoppingListTime</a:t>
+            </a:r>
+            <a:r>
+              <a:rPr lang="en-US" altLang="zh-TW" dirty="0"/>
+              <a:t>(</a:t>
+            </a:r>
+            <a:r>
+              <a:rPr lang="en-US" altLang="zh-TW" u="sng" dirty="0" err="1"/>
+              <a:t>sl</a:t>
+            </a:r>
+            <a:r>
+              <a:rPr lang="en-US" altLang="zh-TW" u="sng" dirty="0"/>
+              <a:t>), </a:t>
+            </a:r>
+            <a:r>
+              <a:rPr lang="en-US" altLang="zh-TW" u="sng" dirty="0" err="1"/>
+              <a:t>rb</a:t>
+            </a:r>
+            <a:r>
+              <a:rPr lang="en-US" altLang="zh-TW" u="sng" dirty="0"/>
+              <a:t>, </a:t>
+            </a:r>
+            <a:r>
+              <a:rPr lang="en-US" altLang="zh-TW" u="sng" dirty="0" err="1"/>
+              <a:t>pb</a:t>
+            </a:r>
+            <a:r>
+              <a:rPr lang="en-US" altLang="zh-TW" u="sng" dirty="0"/>
+              <a:t>);</a:t>
+            </a:r>
+          </a:p>
+          <a:p>
+            <a:r>
+              <a:rPr lang="en-US" altLang="zh-TW" b="1" dirty="0" err="1"/>
+              <a:t>InputProbability</a:t>
+            </a:r>
+            <a:r>
+              <a:rPr lang="en-US" altLang="zh-TW" b="1" dirty="0"/>
+              <a:t> </a:t>
+            </a:r>
+            <a:r>
+              <a:rPr lang="en-US" altLang="zh-TW" b="1" dirty="0" err="1"/>
+              <a:t>inputProbability</a:t>
+            </a:r>
+            <a:r>
+              <a:rPr lang="en-US" altLang="zh-TW" b="1" dirty="0"/>
+              <a:t> = new </a:t>
+            </a:r>
+            <a:r>
+              <a:rPr lang="en-US" altLang="zh-TW" b="1" dirty="0" err="1"/>
+              <a:t>InputProbability</a:t>
+            </a:r>
+            <a:r>
+              <a:rPr lang="en-US" altLang="zh-TW" b="1" dirty="0"/>
+              <a:t>();</a:t>
+            </a:r>
+          </a:p>
+          <a:p>
+            <a:r>
+              <a:rPr lang="en-US" altLang="zh-TW" dirty="0" err="1"/>
+              <a:t>inputProbability.start</a:t>
+            </a:r>
+            <a:r>
+              <a:rPr lang="en-US" altLang="zh-TW" dirty="0"/>
+              <a:t>();</a:t>
+            </a:r>
+          </a:p>
+          <a:p>
+            <a:endParaRPr lang="zh-TW" altLang="en-US" dirty="0"/>
+          </a:p>
+          <a:p>
+            <a:r>
+              <a:rPr lang="en-US" altLang="zh-TW" b="1" dirty="0" err="1"/>
+              <a:t>Thread.</a:t>
+            </a:r>
+            <a:r>
+              <a:rPr lang="en-US" altLang="zh-TW" b="1" i="1" dirty="0" err="1"/>
+              <a:t>yield</a:t>
+            </a:r>
+            <a:r>
+              <a:rPr lang="en-US" altLang="zh-TW" b="1" i="1"/>
+              <a:t>();</a:t>
+            </a:r>
+            <a:endParaRPr lang="zh-TW" altLang="en-US" dirty="0"/>
+          </a:p>
+        </p:txBody>
+      </p:sp>
+    </p:spTree>
+    <p:extLst>
+      <p:ext uri="{BB962C8B-B14F-4D97-AF65-F5344CB8AC3E}">
+        <p14:creationId xmlns:p14="http://schemas.microsoft.com/office/powerpoint/2010/main" val="3411428608"/>
+      </p:ext>
+    </p:extLst>
+  </p:cSld>
+  <p:clrMapOvr>
+    <a:masterClrMapping/>
+  </p:clrMapOvr>
+</p:sld>
+</file>
+
+<file path=ppt/slides/slide18.xml><?xml version="1.0" encoding="utf-8"?>
+<p:sld xmlns:a="http://schemas.openxmlformats.org/drawingml/2006/main" xmlns:r="http://schemas.openxmlformats.org/officeDocument/2006/relationships" xmlns:p="http://schemas.openxmlformats.org/presentationml/2006/main">
+  <p:cSld>
+    <p:spTree>
+      <p:nvGrpSpPr>
+        <p:cNvPr id="1" name=""/>
+        <p:cNvGrpSpPr/>
+        <p:nvPr/>
+      </p:nvGrpSpPr>
+      <p:grpSpPr>
+        <a:xfrm>
+          <a:off x="0" y="0"/>
+          <a:ext cx="0" cy="0"/>
+          <a:chOff x="0" y="0"/>
+          <a:chExt cx="0" cy="0"/>
+        </a:xfrm>
+      </p:grpSpPr>
+      <p:sp>
+        <p:nvSpPr>
+          <p:cNvPr id="2" name="標題 1"/>
+          <p:cNvSpPr>
+            <a:spLocks noGrp="1"/>
+          </p:cNvSpPr>
+          <p:nvPr>
+            <p:ph type="title"/>
+          </p:nvPr>
+        </p:nvSpPr>
+        <p:spPr/>
+        <p:txBody>
+          <a:bodyPr/>
+          <a:lstStyle/>
+          <a:p>
+            <a:r>
+              <a:rPr lang="en-US" altLang="zh-TW" dirty="0"/>
+              <a:t>In time </a:t>
+            </a:r>
+            <a:r>
+              <a:rPr lang="en-US" altLang="zh-TW" dirty="0"/>
+              <a:t>suggestion on </a:t>
             </a:r>
             <a:r>
               <a:rPr lang="en-US" altLang="zh-TW" dirty="0" err="1"/>
@@ -4474,17 +4730,17 @@
           <a:p>
             <a:r>
               <a:rPr lang="en-US" altLang="zh-TW" dirty="0" smtClean="0"/>
-              <a:t>Add </a:t>
-            </a:r>
+              <a:t>Add E-mail</a:t>
+            </a:r>
+          </a:p>
+          <a:p>
             <a:r>
               <a:rPr lang="en-US" altLang="zh-TW" dirty="0" smtClean="0"/>
-              <a:t>E-mail</a:t>
-            </a:r>
-          </a:p>
-          <a:p>
+              <a:t>In time </a:t>
+            </a:r>
             <a:r>
               <a:rPr lang="en-US" altLang="zh-TW" dirty="0" smtClean="0"/>
-              <a:t>Online suggestion on </a:t>
+              <a:t>suggestion on </a:t>
             </a:r>
             <a:r>
               <a:rPr lang="en-US" altLang="zh-TW" dirty="0" err="1" smtClean="0"/>

</xml_diff>